<commit_message>
Fixed issues about tech reps in the figure
</commit_message>
<xml_diff>
--- a/specification_document-developments/1_1-Metabolomics-Draft/ExperimentalDesign.pptx
+++ b/specification_document-developments/1_1-Metabolomics-Draft/ExperimentalDesign.pptx
@@ -104,6 +104,11 @@
       </a:defRPr>
     </a:lvl9pPr>
   </p:defaultTextStyle>
+  <p:extLst>
+    <p:ext uri="{EFAFB233-063F-42B5-8137-9DF3F51BA10A}">
+      <p15:sldGuideLst xmlns:p15="http://schemas.microsoft.com/office/powerpoint/2012/main"/>
+    </p:ext>
+  </p:extLst>
 </p:presentation>
 </file>
 
@@ -238,7 +243,7 @@
           <a:p>
             <a:fld id="{43520AFC-A4C0-48BF-AA6D-EADC8EADEEEB}" type="datetimeFigureOut">
               <a:rPr lang="en-GB" smtClean="0"/>
-              <a:t>22/08/2017</a:t>
+              <a:t>17/05/2018</a:t>
             </a:fld>
             <a:endParaRPr lang="en-GB"/>
           </a:p>
@@ -408,7 +413,7 @@
           <a:p>
             <a:fld id="{43520AFC-A4C0-48BF-AA6D-EADC8EADEEEB}" type="datetimeFigureOut">
               <a:rPr lang="en-GB" smtClean="0"/>
-              <a:t>22/08/2017</a:t>
+              <a:t>17/05/2018</a:t>
             </a:fld>
             <a:endParaRPr lang="en-GB"/>
           </a:p>
@@ -588,7 +593,7 @@
           <a:p>
             <a:fld id="{43520AFC-A4C0-48BF-AA6D-EADC8EADEEEB}" type="datetimeFigureOut">
               <a:rPr lang="en-GB" smtClean="0"/>
-              <a:t>22/08/2017</a:t>
+              <a:t>17/05/2018</a:t>
             </a:fld>
             <a:endParaRPr lang="en-GB"/>
           </a:p>
@@ -758,7 +763,7 @@
           <a:p>
             <a:fld id="{43520AFC-A4C0-48BF-AA6D-EADC8EADEEEB}" type="datetimeFigureOut">
               <a:rPr lang="en-GB" smtClean="0"/>
-              <a:t>22/08/2017</a:t>
+              <a:t>17/05/2018</a:t>
             </a:fld>
             <a:endParaRPr lang="en-GB"/>
           </a:p>
@@ -1004,7 +1009,7 @@
           <a:p>
             <a:fld id="{43520AFC-A4C0-48BF-AA6D-EADC8EADEEEB}" type="datetimeFigureOut">
               <a:rPr lang="en-GB" smtClean="0"/>
-              <a:t>22/08/2017</a:t>
+              <a:t>17/05/2018</a:t>
             </a:fld>
             <a:endParaRPr lang="en-GB"/>
           </a:p>
@@ -1236,7 +1241,7 @@
           <a:p>
             <a:fld id="{43520AFC-A4C0-48BF-AA6D-EADC8EADEEEB}" type="datetimeFigureOut">
               <a:rPr lang="en-GB" smtClean="0"/>
-              <a:t>22/08/2017</a:t>
+              <a:t>17/05/2018</a:t>
             </a:fld>
             <a:endParaRPr lang="en-GB"/>
           </a:p>
@@ -1603,7 +1608,7 @@
           <a:p>
             <a:fld id="{43520AFC-A4C0-48BF-AA6D-EADC8EADEEEB}" type="datetimeFigureOut">
               <a:rPr lang="en-GB" smtClean="0"/>
-              <a:t>22/08/2017</a:t>
+              <a:t>17/05/2018</a:t>
             </a:fld>
             <a:endParaRPr lang="en-GB"/>
           </a:p>
@@ -1721,7 +1726,7 @@
           <a:p>
             <a:fld id="{43520AFC-A4C0-48BF-AA6D-EADC8EADEEEB}" type="datetimeFigureOut">
               <a:rPr lang="en-GB" smtClean="0"/>
-              <a:t>22/08/2017</a:t>
+              <a:t>17/05/2018</a:t>
             </a:fld>
             <a:endParaRPr lang="en-GB"/>
           </a:p>
@@ -1816,7 +1821,7 @@
           <a:p>
             <a:fld id="{43520AFC-A4C0-48BF-AA6D-EADC8EADEEEB}" type="datetimeFigureOut">
               <a:rPr lang="en-GB" smtClean="0"/>
-              <a:t>22/08/2017</a:t>
+              <a:t>17/05/2018</a:t>
             </a:fld>
             <a:endParaRPr lang="en-GB"/>
           </a:p>
@@ -2093,7 +2098,7 @@
           <a:p>
             <a:fld id="{43520AFC-A4C0-48BF-AA6D-EADC8EADEEEB}" type="datetimeFigureOut">
               <a:rPr lang="en-GB" smtClean="0"/>
-              <a:t>22/08/2017</a:t>
+              <a:t>17/05/2018</a:t>
             </a:fld>
             <a:endParaRPr lang="en-GB"/>
           </a:p>
@@ -2350,7 +2355,7 @@
           <a:p>
             <a:fld id="{43520AFC-A4C0-48BF-AA6D-EADC8EADEEEB}" type="datetimeFigureOut">
               <a:rPr lang="en-GB" smtClean="0"/>
-              <a:t>22/08/2017</a:t>
+              <a:t>17/05/2018</a:t>
             </a:fld>
             <a:endParaRPr lang="en-GB"/>
           </a:p>
@@ -2563,7 +2568,7 @@
           <a:p>
             <a:fld id="{43520AFC-A4C0-48BF-AA6D-EADC8EADEEEB}" type="datetimeFigureOut">
               <a:rPr lang="en-GB" smtClean="0"/>
-              <a:t>22/08/2017</a:t>
+              <a:t>17/05/2018</a:t>
             </a:fld>
             <a:endParaRPr lang="en-GB"/>
           </a:p>
@@ -2973,7 +2978,7 @@
           <p:cNvPr id="5" name="Straight Arrow Connector 4">
             <a:extLst>
               <a:ext uri="{FF2B5EF4-FFF2-40B4-BE49-F238E27FC236}">
-                <a16:creationId xmlns:a16="http://schemas.microsoft.com/office/drawing/2014/main" id="{F8307C2E-3CA8-441E-AAB1-00061E67391A}"/>
+                <a16:creationId xmlns:a16="http://schemas.microsoft.com/office/drawing/2014/main" xmlns="" id="{F8307C2E-3CA8-441E-AAB1-00061E67391A}"/>
               </a:ext>
             </a:extLst>
           </p:cNvPr>
@@ -3015,7 +3020,7 @@
           <p:cNvPr id="6" name="Straight Arrow Connector 5">
             <a:extLst>
               <a:ext uri="{FF2B5EF4-FFF2-40B4-BE49-F238E27FC236}">
-                <a16:creationId xmlns:a16="http://schemas.microsoft.com/office/drawing/2014/main" id="{2F8AC3AC-E60E-456A-9799-8BF592493131}"/>
+                <a16:creationId xmlns:a16="http://schemas.microsoft.com/office/drawing/2014/main" xmlns="" id="{2F8AC3AC-E60E-456A-9799-8BF592493131}"/>
               </a:ext>
             </a:extLst>
           </p:cNvPr>
@@ -3057,7 +3062,7 @@
           <p:cNvPr id="7" name="Straight Arrow Connector 6">
             <a:extLst>
               <a:ext uri="{FF2B5EF4-FFF2-40B4-BE49-F238E27FC236}">
-                <a16:creationId xmlns:a16="http://schemas.microsoft.com/office/drawing/2014/main" id="{A2639EDF-757B-45A7-B78D-2EBF4252A8B5}"/>
+                <a16:creationId xmlns:a16="http://schemas.microsoft.com/office/drawing/2014/main" xmlns="" id="{A2639EDF-757B-45A7-B78D-2EBF4252A8B5}"/>
               </a:ext>
             </a:extLst>
           </p:cNvPr>
@@ -3099,7 +3104,7 @@
           <p:cNvPr id="8" name="Straight Arrow Connector 7">
             <a:extLst>
               <a:ext uri="{FF2B5EF4-FFF2-40B4-BE49-F238E27FC236}">
-                <a16:creationId xmlns:a16="http://schemas.microsoft.com/office/drawing/2014/main" id="{F5D9DFEE-5CFC-4672-BD5F-E10CE89333F4}"/>
+                <a16:creationId xmlns:a16="http://schemas.microsoft.com/office/drawing/2014/main" xmlns="" id="{F5D9DFEE-5CFC-4672-BD5F-E10CE89333F4}"/>
               </a:ext>
             </a:extLst>
           </p:cNvPr>
@@ -3141,7 +3146,7 @@
           <p:cNvPr id="9" name="Straight Arrow Connector 8">
             <a:extLst>
               <a:ext uri="{FF2B5EF4-FFF2-40B4-BE49-F238E27FC236}">
-                <a16:creationId xmlns:a16="http://schemas.microsoft.com/office/drawing/2014/main" id="{926C44B1-F2FD-40CA-BFA0-8019881F8EF1}"/>
+                <a16:creationId xmlns:a16="http://schemas.microsoft.com/office/drawing/2014/main" xmlns="" id="{926C44B1-F2FD-40CA-BFA0-8019881F8EF1}"/>
               </a:ext>
             </a:extLst>
           </p:cNvPr>
@@ -3183,7 +3188,7 @@
           <p:cNvPr id="10" name="Straight Arrow Connector 9">
             <a:extLst>
               <a:ext uri="{FF2B5EF4-FFF2-40B4-BE49-F238E27FC236}">
-                <a16:creationId xmlns:a16="http://schemas.microsoft.com/office/drawing/2014/main" id="{A17F0DFD-5B6D-40A5-B83D-A6F9949FBC7E}"/>
+                <a16:creationId xmlns:a16="http://schemas.microsoft.com/office/drawing/2014/main" xmlns="" id="{A17F0DFD-5B6D-40A5-B83D-A6F9949FBC7E}"/>
               </a:ext>
             </a:extLst>
           </p:cNvPr>
@@ -3225,7 +3230,7 @@
           <p:cNvPr id="11" name="TextBox 10">
             <a:extLst>
               <a:ext uri="{FF2B5EF4-FFF2-40B4-BE49-F238E27FC236}">
-                <a16:creationId xmlns:a16="http://schemas.microsoft.com/office/drawing/2014/main" id="{E84EE83E-EDC0-45EF-9EC2-AC1B8FC478B0}"/>
+                <a16:creationId xmlns:a16="http://schemas.microsoft.com/office/drawing/2014/main" xmlns="" id="{E84EE83E-EDC0-45EF-9EC2-AC1B8FC478B0}"/>
               </a:ext>
             </a:extLst>
           </p:cNvPr>
@@ -3277,7 +3282,7 @@
           <p:cNvPr id="12" name="TextBox 11">
             <a:extLst>
               <a:ext uri="{FF2B5EF4-FFF2-40B4-BE49-F238E27FC236}">
-                <a16:creationId xmlns:a16="http://schemas.microsoft.com/office/drawing/2014/main" id="{8673BBF2-B409-4C65-AD2D-C8694D274A87}"/>
+                <a16:creationId xmlns:a16="http://schemas.microsoft.com/office/drawing/2014/main" xmlns="" id="{8673BBF2-B409-4C65-AD2D-C8694D274A87}"/>
               </a:ext>
             </a:extLst>
           </p:cNvPr>
@@ -3326,7 +3331,7 @@
           <p:cNvPr id="13" name="TextBox 12">
             <a:extLst>
               <a:ext uri="{FF2B5EF4-FFF2-40B4-BE49-F238E27FC236}">
-                <a16:creationId xmlns:a16="http://schemas.microsoft.com/office/drawing/2014/main" id="{7CEC4C55-5CF1-4983-93E9-0792C2084C3A}"/>
+                <a16:creationId xmlns:a16="http://schemas.microsoft.com/office/drawing/2014/main" xmlns="" id="{7CEC4C55-5CF1-4983-93E9-0792C2084C3A}"/>
               </a:ext>
             </a:extLst>
           </p:cNvPr>
@@ -3379,7 +3384,7 @@
           <p:cNvPr id="14" name="Straight Arrow Connector 13">
             <a:extLst>
               <a:ext uri="{FF2B5EF4-FFF2-40B4-BE49-F238E27FC236}">
-                <a16:creationId xmlns:a16="http://schemas.microsoft.com/office/drawing/2014/main" id="{17CF58A1-578D-4C1C-BFE4-2F9753E26C03}"/>
+                <a16:creationId xmlns:a16="http://schemas.microsoft.com/office/drawing/2014/main" xmlns="" id="{17CF58A1-578D-4C1C-BFE4-2F9753E26C03}"/>
               </a:ext>
             </a:extLst>
           </p:cNvPr>
@@ -3421,7 +3426,7 @@
           <p:cNvPr id="15" name="TextBox 14">
             <a:extLst>
               <a:ext uri="{FF2B5EF4-FFF2-40B4-BE49-F238E27FC236}">
-                <a16:creationId xmlns:a16="http://schemas.microsoft.com/office/drawing/2014/main" id="{5524E355-D66D-4718-8481-D0ECF147D1A5}"/>
+                <a16:creationId xmlns:a16="http://schemas.microsoft.com/office/drawing/2014/main" xmlns="" id="{5524E355-D66D-4718-8481-D0ECF147D1A5}"/>
               </a:ext>
             </a:extLst>
           </p:cNvPr>
@@ -3470,7 +3475,7 @@
           <p:cNvPr id="16" name="TextBox 15">
             <a:extLst>
               <a:ext uri="{FF2B5EF4-FFF2-40B4-BE49-F238E27FC236}">
-                <a16:creationId xmlns:a16="http://schemas.microsoft.com/office/drawing/2014/main" id="{2B28615F-7E2E-4EF7-8938-6EA14F2511C1}"/>
+                <a16:creationId xmlns:a16="http://schemas.microsoft.com/office/drawing/2014/main" xmlns="" id="{2B28615F-7E2E-4EF7-8938-6EA14F2511C1}"/>
               </a:ext>
             </a:extLst>
           </p:cNvPr>
@@ -3523,7 +3528,7 @@
           <p:cNvPr id="17" name="Straight Arrow Connector 16">
             <a:extLst>
               <a:ext uri="{FF2B5EF4-FFF2-40B4-BE49-F238E27FC236}">
-                <a16:creationId xmlns:a16="http://schemas.microsoft.com/office/drawing/2014/main" id="{668C2DE0-E826-48FD-93EA-B5DE5BD0B290}"/>
+                <a16:creationId xmlns:a16="http://schemas.microsoft.com/office/drawing/2014/main" xmlns="" id="{668C2DE0-E826-48FD-93EA-B5DE5BD0B290}"/>
               </a:ext>
             </a:extLst>
           </p:cNvPr>
@@ -3565,7 +3570,7 @@
           <p:cNvPr id="18" name="TextBox 17">
             <a:extLst>
               <a:ext uri="{FF2B5EF4-FFF2-40B4-BE49-F238E27FC236}">
-                <a16:creationId xmlns:a16="http://schemas.microsoft.com/office/drawing/2014/main" id="{159402A0-0DED-4652-97D9-8608F6E9C87A}"/>
+                <a16:creationId xmlns:a16="http://schemas.microsoft.com/office/drawing/2014/main" xmlns="" id="{159402A0-0DED-4652-97D9-8608F6E9C87A}"/>
               </a:ext>
             </a:extLst>
           </p:cNvPr>
@@ -3614,7 +3619,7 @@
           <p:cNvPr id="19" name="TextBox 18">
             <a:extLst>
               <a:ext uri="{FF2B5EF4-FFF2-40B4-BE49-F238E27FC236}">
-                <a16:creationId xmlns:a16="http://schemas.microsoft.com/office/drawing/2014/main" id="{2A25259E-7CEC-49C9-A733-5694DC9D7264}"/>
+                <a16:creationId xmlns:a16="http://schemas.microsoft.com/office/drawing/2014/main" xmlns="" id="{2A25259E-7CEC-49C9-A733-5694DC9D7264}"/>
               </a:ext>
             </a:extLst>
           </p:cNvPr>
@@ -3667,7 +3672,7 @@
           <p:cNvPr id="20" name="Straight Arrow Connector 19">
             <a:extLst>
               <a:ext uri="{FF2B5EF4-FFF2-40B4-BE49-F238E27FC236}">
-                <a16:creationId xmlns:a16="http://schemas.microsoft.com/office/drawing/2014/main" id="{2114A1FE-9D53-47F1-B568-394DB3EA6E03}"/>
+                <a16:creationId xmlns:a16="http://schemas.microsoft.com/office/drawing/2014/main" xmlns="" id="{2114A1FE-9D53-47F1-B568-394DB3EA6E03}"/>
               </a:ext>
             </a:extLst>
           </p:cNvPr>
@@ -3709,7 +3714,7 @@
           <p:cNvPr id="21" name="Straight Arrow Connector 20">
             <a:extLst>
               <a:ext uri="{FF2B5EF4-FFF2-40B4-BE49-F238E27FC236}">
-                <a16:creationId xmlns:a16="http://schemas.microsoft.com/office/drawing/2014/main" id="{80DA5C63-E51D-48BF-A9BB-FAECB8F0BB54}"/>
+                <a16:creationId xmlns:a16="http://schemas.microsoft.com/office/drawing/2014/main" xmlns="" id="{80DA5C63-E51D-48BF-A9BB-FAECB8F0BB54}"/>
               </a:ext>
             </a:extLst>
           </p:cNvPr>
@@ -3751,7 +3756,7 @@
           <p:cNvPr id="22" name="Straight Arrow Connector 21">
             <a:extLst>
               <a:ext uri="{FF2B5EF4-FFF2-40B4-BE49-F238E27FC236}">
-                <a16:creationId xmlns:a16="http://schemas.microsoft.com/office/drawing/2014/main" id="{5A70EE8B-07C2-4883-957F-679BD9FD95F7}"/>
+                <a16:creationId xmlns:a16="http://schemas.microsoft.com/office/drawing/2014/main" xmlns="" id="{5A70EE8B-07C2-4883-957F-679BD9FD95F7}"/>
               </a:ext>
             </a:extLst>
           </p:cNvPr>
@@ -3793,7 +3798,7 @@
           <p:cNvPr id="23" name="Straight Arrow Connector 22">
             <a:extLst>
               <a:ext uri="{FF2B5EF4-FFF2-40B4-BE49-F238E27FC236}">
-                <a16:creationId xmlns:a16="http://schemas.microsoft.com/office/drawing/2014/main" id="{0450A24E-B1E8-4608-ACA8-FE59190A0167}"/>
+                <a16:creationId xmlns:a16="http://schemas.microsoft.com/office/drawing/2014/main" xmlns="" id="{0450A24E-B1E8-4608-ACA8-FE59190A0167}"/>
               </a:ext>
             </a:extLst>
           </p:cNvPr>
@@ -3835,7 +3840,7 @@
           <p:cNvPr id="24" name="TextBox 23">
             <a:extLst>
               <a:ext uri="{FF2B5EF4-FFF2-40B4-BE49-F238E27FC236}">
-                <a16:creationId xmlns:a16="http://schemas.microsoft.com/office/drawing/2014/main" id="{B4070D1E-1C02-4B54-AADA-1002EF6E482D}"/>
+                <a16:creationId xmlns:a16="http://schemas.microsoft.com/office/drawing/2014/main" xmlns="" id="{B4070D1E-1C02-4B54-AADA-1002EF6E482D}"/>
               </a:ext>
             </a:extLst>
           </p:cNvPr>
@@ -3887,7 +3892,7 @@
           <p:cNvPr id="25" name="TextBox 24">
             <a:extLst>
               <a:ext uri="{FF2B5EF4-FFF2-40B4-BE49-F238E27FC236}">
-                <a16:creationId xmlns:a16="http://schemas.microsoft.com/office/drawing/2014/main" id="{14C1C98A-CED4-4AE0-922F-41BC3B7D25BB}"/>
+                <a16:creationId xmlns:a16="http://schemas.microsoft.com/office/drawing/2014/main" xmlns="" id="{14C1C98A-CED4-4AE0-922F-41BC3B7D25BB}"/>
               </a:ext>
             </a:extLst>
           </p:cNvPr>
@@ -3936,7 +3941,7 @@
           <p:cNvPr id="26" name="TextBox 25">
             <a:extLst>
               <a:ext uri="{FF2B5EF4-FFF2-40B4-BE49-F238E27FC236}">
-                <a16:creationId xmlns:a16="http://schemas.microsoft.com/office/drawing/2014/main" id="{181642B3-048B-4362-9729-756E41234777}"/>
+                <a16:creationId xmlns:a16="http://schemas.microsoft.com/office/drawing/2014/main" xmlns="" id="{181642B3-048B-4362-9729-756E41234777}"/>
               </a:ext>
             </a:extLst>
           </p:cNvPr>
@@ -3989,7 +3994,7 @@
           <p:cNvPr id="27" name="Straight Arrow Connector 26">
             <a:extLst>
               <a:ext uri="{FF2B5EF4-FFF2-40B4-BE49-F238E27FC236}">
-                <a16:creationId xmlns:a16="http://schemas.microsoft.com/office/drawing/2014/main" id="{6564E5E1-2B35-4A7C-9EE0-80AEAC1F309A}"/>
+                <a16:creationId xmlns:a16="http://schemas.microsoft.com/office/drawing/2014/main" xmlns="" id="{6564E5E1-2B35-4A7C-9EE0-80AEAC1F309A}"/>
               </a:ext>
             </a:extLst>
           </p:cNvPr>
@@ -4031,7 +4036,7 @@
           <p:cNvPr id="28" name="TextBox 27">
             <a:extLst>
               <a:ext uri="{FF2B5EF4-FFF2-40B4-BE49-F238E27FC236}">
-                <a16:creationId xmlns:a16="http://schemas.microsoft.com/office/drawing/2014/main" id="{36A6C2C4-D180-4434-9517-3CF1DA92C105}"/>
+                <a16:creationId xmlns:a16="http://schemas.microsoft.com/office/drawing/2014/main" xmlns="" id="{36A6C2C4-D180-4434-9517-3CF1DA92C105}"/>
               </a:ext>
             </a:extLst>
           </p:cNvPr>
@@ -4080,7 +4085,7 @@
           <p:cNvPr id="29" name="TextBox 28">
             <a:extLst>
               <a:ext uri="{FF2B5EF4-FFF2-40B4-BE49-F238E27FC236}">
-                <a16:creationId xmlns:a16="http://schemas.microsoft.com/office/drawing/2014/main" id="{27548BD1-B9A0-46A4-90EE-5A9FB35108F5}"/>
+                <a16:creationId xmlns:a16="http://schemas.microsoft.com/office/drawing/2014/main" xmlns="" id="{27548BD1-B9A0-46A4-90EE-5A9FB35108F5}"/>
               </a:ext>
             </a:extLst>
           </p:cNvPr>
@@ -4133,7 +4138,7 @@
           <p:cNvPr id="30" name="Straight Arrow Connector 29">
             <a:extLst>
               <a:ext uri="{FF2B5EF4-FFF2-40B4-BE49-F238E27FC236}">
-                <a16:creationId xmlns:a16="http://schemas.microsoft.com/office/drawing/2014/main" id="{CEA12D14-7A90-4B43-BC6C-B46630CCDD15}"/>
+                <a16:creationId xmlns:a16="http://schemas.microsoft.com/office/drawing/2014/main" xmlns="" id="{CEA12D14-7A90-4B43-BC6C-B46630CCDD15}"/>
               </a:ext>
             </a:extLst>
           </p:cNvPr>
@@ -4175,7 +4180,7 @@
           <p:cNvPr id="31" name="TextBox 30">
             <a:extLst>
               <a:ext uri="{FF2B5EF4-FFF2-40B4-BE49-F238E27FC236}">
-                <a16:creationId xmlns:a16="http://schemas.microsoft.com/office/drawing/2014/main" id="{4C324F9F-F30C-440D-A6FB-30629CC8EE83}"/>
+                <a16:creationId xmlns:a16="http://schemas.microsoft.com/office/drawing/2014/main" xmlns="" id="{4C324F9F-F30C-440D-A6FB-30629CC8EE83}"/>
               </a:ext>
             </a:extLst>
           </p:cNvPr>
@@ -4224,7 +4229,7 @@
           <p:cNvPr id="32" name="TextBox 31">
             <a:extLst>
               <a:ext uri="{FF2B5EF4-FFF2-40B4-BE49-F238E27FC236}">
-                <a16:creationId xmlns:a16="http://schemas.microsoft.com/office/drawing/2014/main" id="{A93539A6-176C-4B81-BAB6-25F32D11A89A}"/>
+                <a16:creationId xmlns:a16="http://schemas.microsoft.com/office/drawing/2014/main" xmlns="" id="{A93539A6-176C-4B81-BAB6-25F32D11A89A}"/>
               </a:ext>
             </a:extLst>
           </p:cNvPr>
@@ -4277,7 +4282,7 @@
           <p:cNvPr id="33" name="Straight Arrow Connector 32">
             <a:extLst>
               <a:ext uri="{FF2B5EF4-FFF2-40B4-BE49-F238E27FC236}">
-                <a16:creationId xmlns:a16="http://schemas.microsoft.com/office/drawing/2014/main" id="{4C99410D-C396-4695-BC1D-EF536BFB40C2}"/>
+                <a16:creationId xmlns:a16="http://schemas.microsoft.com/office/drawing/2014/main" xmlns="" id="{4C99410D-C396-4695-BC1D-EF536BFB40C2}"/>
               </a:ext>
             </a:extLst>
           </p:cNvPr>
@@ -4319,7 +4324,7 @@
           <p:cNvPr id="34" name="Straight Arrow Connector 33">
             <a:extLst>
               <a:ext uri="{FF2B5EF4-FFF2-40B4-BE49-F238E27FC236}">
-                <a16:creationId xmlns:a16="http://schemas.microsoft.com/office/drawing/2014/main" id="{1DD73768-97C0-44C8-BBEC-2AE6ECDF03C8}"/>
+                <a16:creationId xmlns:a16="http://schemas.microsoft.com/office/drawing/2014/main" xmlns="" id="{1DD73768-97C0-44C8-BBEC-2AE6ECDF03C8}"/>
               </a:ext>
             </a:extLst>
           </p:cNvPr>
@@ -4361,7 +4366,7 @@
           <p:cNvPr id="35" name="Straight Arrow Connector 34">
             <a:extLst>
               <a:ext uri="{FF2B5EF4-FFF2-40B4-BE49-F238E27FC236}">
-                <a16:creationId xmlns:a16="http://schemas.microsoft.com/office/drawing/2014/main" id="{64370FB0-2AF8-4DDF-96F2-C52F5DA96BE2}"/>
+                <a16:creationId xmlns:a16="http://schemas.microsoft.com/office/drawing/2014/main" xmlns="" id="{64370FB0-2AF8-4DDF-96F2-C52F5DA96BE2}"/>
               </a:ext>
             </a:extLst>
           </p:cNvPr>
@@ -4403,7 +4408,7 @@
           <p:cNvPr id="36" name="Straight Arrow Connector 35">
             <a:extLst>
               <a:ext uri="{FF2B5EF4-FFF2-40B4-BE49-F238E27FC236}">
-                <a16:creationId xmlns:a16="http://schemas.microsoft.com/office/drawing/2014/main" id="{C8575D11-7D63-4FA7-8CFC-6374C24DC4D5}"/>
+                <a16:creationId xmlns:a16="http://schemas.microsoft.com/office/drawing/2014/main" xmlns="" id="{C8575D11-7D63-4FA7-8CFC-6374C24DC4D5}"/>
               </a:ext>
             </a:extLst>
           </p:cNvPr>
@@ -4445,7 +4450,7 @@
           <p:cNvPr id="37" name="TextBox 36">
             <a:extLst>
               <a:ext uri="{FF2B5EF4-FFF2-40B4-BE49-F238E27FC236}">
-                <a16:creationId xmlns:a16="http://schemas.microsoft.com/office/drawing/2014/main" id="{DFCDEA84-06DF-45B8-A013-43A4A06CD5FA}"/>
+                <a16:creationId xmlns:a16="http://schemas.microsoft.com/office/drawing/2014/main" xmlns="" id="{DFCDEA84-06DF-45B8-A013-43A4A06CD5FA}"/>
               </a:ext>
             </a:extLst>
           </p:cNvPr>
@@ -4494,7 +4499,7 @@
           <p:cNvPr id="38" name="TextBox 37">
             <a:extLst>
               <a:ext uri="{FF2B5EF4-FFF2-40B4-BE49-F238E27FC236}">
-                <a16:creationId xmlns:a16="http://schemas.microsoft.com/office/drawing/2014/main" id="{1B1BB403-C342-4020-80F8-C4EAEF61C2B5}"/>
+                <a16:creationId xmlns:a16="http://schemas.microsoft.com/office/drawing/2014/main" xmlns="" id="{1B1BB403-C342-4020-80F8-C4EAEF61C2B5}"/>
               </a:ext>
             </a:extLst>
           </p:cNvPr>
@@ -4543,7 +4548,7 @@
           <p:cNvPr id="39" name="TextBox 38">
             <a:extLst>
               <a:ext uri="{FF2B5EF4-FFF2-40B4-BE49-F238E27FC236}">
-                <a16:creationId xmlns:a16="http://schemas.microsoft.com/office/drawing/2014/main" id="{45652E6A-B15A-4051-BD1D-0FBBD5EB8002}"/>
+                <a16:creationId xmlns:a16="http://schemas.microsoft.com/office/drawing/2014/main" xmlns="" id="{45652E6A-B15A-4051-BD1D-0FBBD5EB8002}"/>
               </a:ext>
             </a:extLst>
           </p:cNvPr>
@@ -4592,7 +4597,7 @@
           <p:cNvPr id="40" name="TextBox 39">
             <a:extLst>
               <a:ext uri="{FF2B5EF4-FFF2-40B4-BE49-F238E27FC236}">
-                <a16:creationId xmlns:a16="http://schemas.microsoft.com/office/drawing/2014/main" id="{8AAD8524-497F-4E72-BC9B-7F55792FB9A7}"/>
+                <a16:creationId xmlns:a16="http://schemas.microsoft.com/office/drawing/2014/main" xmlns="" id="{8AAD8524-497F-4E72-BC9B-7F55792FB9A7}"/>
               </a:ext>
             </a:extLst>
           </p:cNvPr>
@@ -4641,7 +4646,7 @@
           <p:cNvPr id="41" name="TextBox 40">
             <a:extLst>
               <a:ext uri="{FF2B5EF4-FFF2-40B4-BE49-F238E27FC236}">
-                <a16:creationId xmlns:a16="http://schemas.microsoft.com/office/drawing/2014/main" id="{8FC477CC-E11B-4726-A67E-6FD6CEBED709}"/>
+                <a16:creationId xmlns:a16="http://schemas.microsoft.com/office/drawing/2014/main" xmlns="" id="{8FC477CC-E11B-4726-A67E-6FD6CEBED709}"/>
               </a:ext>
             </a:extLst>
           </p:cNvPr>
@@ -4690,7 +4695,7 @@
           <p:cNvPr id="42" name="TextBox 41">
             <a:extLst>
               <a:ext uri="{FF2B5EF4-FFF2-40B4-BE49-F238E27FC236}">
-                <a16:creationId xmlns:a16="http://schemas.microsoft.com/office/drawing/2014/main" id="{B5DC7611-CCCD-477D-B7D1-8F2E241267EF}"/>
+                <a16:creationId xmlns:a16="http://schemas.microsoft.com/office/drawing/2014/main" xmlns="" id="{B5DC7611-CCCD-477D-B7D1-8F2E241267EF}"/>
               </a:ext>
             </a:extLst>
           </p:cNvPr>
@@ -4739,7 +4744,7 @@
           <p:cNvPr id="43" name="TextBox 42">
             <a:extLst>
               <a:ext uri="{FF2B5EF4-FFF2-40B4-BE49-F238E27FC236}">
-                <a16:creationId xmlns:a16="http://schemas.microsoft.com/office/drawing/2014/main" id="{7A0D3565-081F-483E-938A-85C857AD4ABE}"/>
+                <a16:creationId xmlns:a16="http://schemas.microsoft.com/office/drawing/2014/main" xmlns="" id="{7A0D3565-081F-483E-938A-85C857AD4ABE}"/>
               </a:ext>
             </a:extLst>
           </p:cNvPr>
@@ -4749,7 +4754,7 @@
         <p:spPr>
           <a:xfrm>
             <a:off x="593903" y="263419"/>
-            <a:ext cx="11073352" cy="369332"/>
+            <a:ext cx="10776283" cy="369332"/>
           </a:xfrm>
           <a:prstGeom prst="rect">
             <a:avLst/>
@@ -4764,7 +4769,23 @@
           <a:p>
             <a:r>
               <a:rPr lang="en-GB" dirty="0"/>
-              <a:t>Pairwise comparison of two treatments or conditions, with three biological replicates and no technical replicates. </a:t>
+              <a:t>Pairwise comparison of two treatments or conditions, with </a:t>
+            </a:r>
+            <a:r>
+              <a:rPr lang="en-GB" dirty="0" smtClean="0"/>
+              <a:t>no </a:t>
+            </a:r>
+            <a:r>
+              <a:rPr lang="en-GB" dirty="0"/>
+              <a:t>biological replicates and </a:t>
+            </a:r>
+            <a:r>
+              <a:rPr lang="en-GB" dirty="0" smtClean="0"/>
+              <a:t>three </a:t>
+            </a:r>
+            <a:r>
+              <a:rPr lang="en-GB" dirty="0"/>
+              <a:t>technical replicates. </a:t>
             </a:r>
           </a:p>
         </p:txBody>
@@ -4774,7 +4795,7 @@
           <p:cNvPr id="44" name="Straight Arrow Connector 43">
             <a:extLst>
               <a:ext uri="{FF2B5EF4-FFF2-40B4-BE49-F238E27FC236}">
-                <a16:creationId xmlns:a16="http://schemas.microsoft.com/office/drawing/2014/main" id="{A37C1A0C-A307-49E8-84D3-C64C60041FC2}"/>
+                <a16:creationId xmlns:a16="http://schemas.microsoft.com/office/drawing/2014/main" xmlns="" id="{A37C1A0C-A307-49E8-84D3-C64C60041FC2}"/>
               </a:ext>
             </a:extLst>
           </p:cNvPr>
@@ -4816,7 +4837,7 @@
           <p:cNvPr id="45" name="Straight Arrow Connector 44">
             <a:extLst>
               <a:ext uri="{FF2B5EF4-FFF2-40B4-BE49-F238E27FC236}">
-                <a16:creationId xmlns:a16="http://schemas.microsoft.com/office/drawing/2014/main" id="{E50540E4-1A33-4A33-84DE-67321A615DCA}"/>
+                <a16:creationId xmlns:a16="http://schemas.microsoft.com/office/drawing/2014/main" xmlns="" id="{E50540E4-1A33-4A33-84DE-67321A615DCA}"/>
               </a:ext>
             </a:extLst>
           </p:cNvPr>
@@ -4858,7 +4879,7 @@
           <p:cNvPr id="46" name="Straight Arrow Connector 45">
             <a:extLst>
               <a:ext uri="{FF2B5EF4-FFF2-40B4-BE49-F238E27FC236}">
-                <a16:creationId xmlns:a16="http://schemas.microsoft.com/office/drawing/2014/main" id="{C5C2F138-F9EE-4772-95CD-32286E8A9E94}"/>
+                <a16:creationId xmlns:a16="http://schemas.microsoft.com/office/drawing/2014/main" xmlns="" id="{C5C2F138-F9EE-4772-95CD-32286E8A9E94}"/>
               </a:ext>
             </a:extLst>
           </p:cNvPr>
@@ -4900,7 +4921,7 @@
           <p:cNvPr id="47" name="Straight Arrow Connector 46">
             <a:extLst>
               <a:ext uri="{FF2B5EF4-FFF2-40B4-BE49-F238E27FC236}">
-                <a16:creationId xmlns:a16="http://schemas.microsoft.com/office/drawing/2014/main" id="{FF480010-A42D-4880-A199-0EF55FA06A2B}"/>
+                <a16:creationId xmlns:a16="http://schemas.microsoft.com/office/drawing/2014/main" xmlns="" id="{FF480010-A42D-4880-A199-0EF55FA06A2B}"/>
               </a:ext>
             </a:extLst>
           </p:cNvPr>
@@ -4942,7 +4963,7 @@
           <p:cNvPr id="48" name="Straight Arrow Connector 47">
             <a:extLst>
               <a:ext uri="{FF2B5EF4-FFF2-40B4-BE49-F238E27FC236}">
-                <a16:creationId xmlns:a16="http://schemas.microsoft.com/office/drawing/2014/main" id="{2BD04A6A-0110-4413-A931-001EE72AEDC0}"/>
+                <a16:creationId xmlns:a16="http://schemas.microsoft.com/office/drawing/2014/main" xmlns="" id="{2BD04A6A-0110-4413-A931-001EE72AEDC0}"/>
               </a:ext>
             </a:extLst>
           </p:cNvPr>
@@ -4984,7 +5005,7 @@
           <p:cNvPr id="49" name="Straight Arrow Connector 48">
             <a:extLst>
               <a:ext uri="{FF2B5EF4-FFF2-40B4-BE49-F238E27FC236}">
-                <a16:creationId xmlns:a16="http://schemas.microsoft.com/office/drawing/2014/main" id="{E36F1D74-8A46-4684-9CB7-1F026A9BC090}"/>
+                <a16:creationId xmlns:a16="http://schemas.microsoft.com/office/drawing/2014/main" xmlns="" id="{E36F1D74-8A46-4684-9CB7-1F026A9BC090}"/>
               </a:ext>
             </a:extLst>
           </p:cNvPr>
@@ -5026,7 +5047,7 @@
           <p:cNvPr id="50" name="TextBox 49">
             <a:extLst>
               <a:ext uri="{FF2B5EF4-FFF2-40B4-BE49-F238E27FC236}">
-                <a16:creationId xmlns:a16="http://schemas.microsoft.com/office/drawing/2014/main" id="{EAE49F8D-2075-4A00-B31D-604946ABBF81}"/>
+                <a16:creationId xmlns:a16="http://schemas.microsoft.com/office/drawing/2014/main" xmlns="" id="{EAE49F8D-2075-4A00-B31D-604946ABBF81}"/>
               </a:ext>
             </a:extLst>
           </p:cNvPr>
@@ -5078,7 +5099,7 @@
           <p:cNvPr id="51" name="TextBox 50">
             <a:extLst>
               <a:ext uri="{FF2B5EF4-FFF2-40B4-BE49-F238E27FC236}">
-                <a16:creationId xmlns:a16="http://schemas.microsoft.com/office/drawing/2014/main" id="{DB53FC55-DDB0-41F4-8B11-E5C8CCCBA607}"/>
+                <a16:creationId xmlns:a16="http://schemas.microsoft.com/office/drawing/2014/main" xmlns="" id="{DB53FC55-DDB0-41F4-8B11-E5C8CCCBA607}"/>
               </a:ext>
             </a:extLst>
           </p:cNvPr>
@@ -5127,7 +5148,7 @@
           <p:cNvPr id="52" name="TextBox 51">
             <a:extLst>
               <a:ext uri="{FF2B5EF4-FFF2-40B4-BE49-F238E27FC236}">
-                <a16:creationId xmlns:a16="http://schemas.microsoft.com/office/drawing/2014/main" id="{EECB5C90-47D3-4C54-B4DB-5E7302D2E8C5}"/>
+                <a16:creationId xmlns:a16="http://schemas.microsoft.com/office/drawing/2014/main" xmlns="" id="{EECB5C90-47D3-4C54-B4DB-5E7302D2E8C5}"/>
               </a:ext>
             </a:extLst>
           </p:cNvPr>
@@ -5180,7 +5201,7 @@
           <p:cNvPr id="53" name="Straight Arrow Connector 52">
             <a:extLst>
               <a:ext uri="{FF2B5EF4-FFF2-40B4-BE49-F238E27FC236}">
-                <a16:creationId xmlns:a16="http://schemas.microsoft.com/office/drawing/2014/main" id="{F27D3A3C-C8A7-4E6F-A47B-E1B180B7349E}"/>
+                <a16:creationId xmlns:a16="http://schemas.microsoft.com/office/drawing/2014/main" xmlns="" id="{F27D3A3C-C8A7-4E6F-A47B-E1B180B7349E}"/>
               </a:ext>
             </a:extLst>
           </p:cNvPr>
@@ -5222,7 +5243,7 @@
           <p:cNvPr id="54" name="TextBox 53">
             <a:extLst>
               <a:ext uri="{FF2B5EF4-FFF2-40B4-BE49-F238E27FC236}">
-                <a16:creationId xmlns:a16="http://schemas.microsoft.com/office/drawing/2014/main" id="{F06AA69C-6CDD-4A40-8984-C93353FCDFE9}"/>
+                <a16:creationId xmlns:a16="http://schemas.microsoft.com/office/drawing/2014/main" xmlns="" id="{F06AA69C-6CDD-4A40-8984-C93353FCDFE9}"/>
               </a:ext>
             </a:extLst>
           </p:cNvPr>
@@ -5271,7 +5292,7 @@
           <p:cNvPr id="55" name="TextBox 54">
             <a:extLst>
               <a:ext uri="{FF2B5EF4-FFF2-40B4-BE49-F238E27FC236}">
-                <a16:creationId xmlns:a16="http://schemas.microsoft.com/office/drawing/2014/main" id="{5C2E9F42-9C35-4A00-9C1E-62F2044B670D}"/>
+                <a16:creationId xmlns:a16="http://schemas.microsoft.com/office/drawing/2014/main" xmlns="" id="{5C2E9F42-9C35-4A00-9C1E-62F2044B670D}"/>
               </a:ext>
             </a:extLst>
           </p:cNvPr>
@@ -5324,7 +5345,7 @@
           <p:cNvPr id="56" name="Straight Arrow Connector 55">
             <a:extLst>
               <a:ext uri="{FF2B5EF4-FFF2-40B4-BE49-F238E27FC236}">
-                <a16:creationId xmlns:a16="http://schemas.microsoft.com/office/drawing/2014/main" id="{1A6F79DE-6717-4B06-92A6-6C07EA0F81D7}"/>
+                <a16:creationId xmlns:a16="http://schemas.microsoft.com/office/drawing/2014/main" xmlns="" id="{1A6F79DE-6717-4B06-92A6-6C07EA0F81D7}"/>
               </a:ext>
             </a:extLst>
           </p:cNvPr>
@@ -5366,7 +5387,7 @@
           <p:cNvPr id="57" name="TextBox 56">
             <a:extLst>
               <a:ext uri="{FF2B5EF4-FFF2-40B4-BE49-F238E27FC236}">
-                <a16:creationId xmlns:a16="http://schemas.microsoft.com/office/drawing/2014/main" id="{94C5D4FE-764E-4EA5-A7D7-8E4639F37E24}"/>
+                <a16:creationId xmlns:a16="http://schemas.microsoft.com/office/drawing/2014/main" xmlns="" id="{94C5D4FE-764E-4EA5-A7D7-8E4639F37E24}"/>
               </a:ext>
             </a:extLst>
           </p:cNvPr>
@@ -5415,7 +5436,7 @@
           <p:cNvPr id="58" name="TextBox 57">
             <a:extLst>
               <a:ext uri="{FF2B5EF4-FFF2-40B4-BE49-F238E27FC236}">
-                <a16:creationId xmlns:a16="http://schemas.microsoft.com/office/drawing/2014/main" id="{02430570-0B37-48CB-B21A-4BE2D64DA825}"/>
+                <a16:creationId xmlns:a16="http://schemas.microsoft.com/office/drawing/2014/main" xmlns="" id="{02430570-0B37-48CB-B21A-4BE2D64DA825}"/>
               </a:ext>
             </a:extLst>
           </p:cNvPr>
@@ -5468,7 +5489,7 @@
           <p:cNvPr id="59" name="Straight Arrow Connector 58">
             <a:extLst>
               <a:ext uri="{FF2B5EF4-FFF2-40B4-BE49-F238E27FC236}">
-                <a16:creationId xmlns:a16="http://schemas.microsoft.com/office/drawing/2014/main" id="{F3D15B79-3353-4538-8969-0988740FF3E8}"/>
+                <a16:creationId xmlns:a16="http://schemas.microsoft.com/office/drawing/2014/main" xmlns="" id="{F3D15B79-3353-4538-8969-0988740FF3E8}"/>
               </a:ext>
             </a:extLst>
           </p:cNvPr>
@@ -5510,7 +5531,7 @@
           <p:cNvPr id="60" name="Straight Arrow Connector 59">
             <a:extLst>
               <a:ext uri="{FF2B5EF4-FFF2-40B4-BE49-F238E27FC236}">
-                <a16:creationId xmlns:a16="http://schemas.microsoft.com/office/drawing/2014/main" id="{EA1C5DA7-C793-4CE8-B342-72695989C060}"/>
+                <a16:creationId xmlns:a16="http://schemas.microsoft.com/office/drawing/2014/main" xmlns="" id="{EA1C5DA7-C793-4CE8-B342-72695989C060}"/>
               </a:ext>
             </a:extLst>
           </p:cNvPr>
@@ -5552,7 +5573,7 @@
           <p:cNvPr id="61" name="Straight Arrow Connector 60">
             <a:extLst>
               <a:ext uri="{FF2B5EF4-FFF2-40B4-BE49-F238E27FC236}">
-                <a16:creationId xmlns:a16="http://schemas.microsoft.com/office/drawing/2014/main" id="{955DDE6E-6FBD-46F0-A436-D4B1D3BAB163}"/>
+                <a16:creationId xmlns:a16="http://schemas.microsoft.com/office/drawing/2014/main" xmlns="" id="{955DDE6E-6FBD-46F0-A436-D4B1D3BAB163}"/>
               </a:ext>
             </a:extLst>
           </p:cNvPr>
@@ -5594,7 +5615,7 @@
           <p:cNvPr id="62" name="Straight Arrow Connector 61">
             <a:extLst>
               <a:ext uri="{FF2B5EF4-FFF2-40B4-BE49-F238E27FC236}">
-                <a16:creationId xmlns:a16="http://schemas.microsoft.com/office/drawing/2014/main" id="{53965DF6-0CE4-4F37-A27E-06B69FA66B4F}"/>
+                <a16:creationId xmlns:a16="http://schemas.microsoft.com/office/drawing/2014/main" xmlns="" id="{53965DF6-0CE4-4F37-A27E-06B69FA66B4F}"/>
               </a:ext>
             </a:extLst>
           </p:cNvPr>
@@ -5636,7 +5657,7 @@
           <p:cNvPr id="63" name="TextBox 62">
             <a:extLst>
               <a:ext uri="{FF2B5EF4-FFF2-40B4-BE49-F238E27FC236}">
-                <a16:creationId xmlns:a16="http://schemas.microsoft.com/office/drawing/2014/main" id="{18455862-600D-4E02-A8FA-51DE00243AC6}"/>
+                <a16:creationId xmlns:a16="http://schemas.microsoft.com/office/drawing/2014/main" xmlns="" id="{18455862-600D-4E02-A8FA-51DE00243AC6}"/>
               </a:ext>
             </a:extLst>
           </p:cNvPr>
@@ -5688,7 +5709,7 @@
           <p:cNvPr id="64" name="TextBox 63">
             <a:extLst>
               <a:ext uri="{FF2B5EF4-FFF2-40B4-BE49-F238E27FC236}">
-                <a16:creationId xmlns:a16="http://schemas.microsoft.com/office/drawing/2014/main" id="{A59CD8F1-878B-4D6E-B8D2-27739299F7CF}"/>
+                <a16:creationId xmlns:a16="http://schemas.microsoft.com/office/drawing/2014/main" xmlns="" id="{A59CD8F1-878B-4D6E-B8D2-27739299F7CF}"/>
               </a:ext>
             </a:extLst>
           </p:cNvPr>
@@ -5737,7 +5758,7 @@
           <p:cNvPr id="65" name="TextBox 64">
             <a:extLst>
               <a:ext uri="{FF2B5EF4-FFF2-40B4-BE49-F238E27FC236}">
-                <a16:creationId xmlns:a16="http://schemas.microsoft.com/office/drawing/2014/main" id="{51BD218C-DDD8-4DCF-9DC5-9FB31A127B0C}"/>
+                <a16:creationId xmlns:a16="http://schemas.microsoft.com/office/drawing/2014/main" xmlns="" id="{51BD218C-DDD8-4DCF-9DC5-9FB31A127B0C}"/>
               </a:ext>
             </a:extLst>
           </p:cNvPr>
@@ -5790,7 +5811,7 @@
           <p:cNvPr id="66" name="Straight Arrow Connector 65">
             <a:extLst>
               <a:ext uri="{FF2B5EF4-FFF2-40B4-BE49-F238E27FC236}">
-                <a16:creationId xmlns:a16="http://schemas.microsoft.com/office/drawing/2014/main" id="{D94357F4-7B6B-49AD-BF24-3F1C0F4211B4}"/>
+                <a16:creationId xmlns:a16="http://schemas.microsoft.com/office/drawing/2014/main" xmlns="" id="{D94357F4-7B6B-49AD-BF24-3F1C0F4211B4}"/>
               </a:ext>
             </a:extLst>
           </p:cNvPr>
@@ -5832,7 +5853,7 @@
           <p:cNvPr id="67" name="TextBox 66">
             <a:extLst>
               <a:ext uri="{FF2B5EF4-FFF2-40B4-BE49-F238E27FC236}">
-                <a16:creationId xmlns:a16="http://schemas.microsoft.com/office/drawing/2014/main" id="{F7408FE5-DF2E-4CEE-86FF-FC27827A073B}"/>
+                <a16:creationId xmlns:a16="http://schemas.microsoft.com/office/drawing/2014/main" xmlns="" id="{F7408FE5-DF2E-4CEE-86FF-FC27827A073B}"/>
               </a:ext>
             </a:extLst>
           </p:cNvPr>
@@ -5881,7 +5902,7 @@
           <p:cNvPr id="68" name="TextBox 67">
             <a:extLst>
               <a:ext uri="{FF2B5EF4-FFF2-40B4-BE49-F238E27FC236}">
-                <a16:creationId xmlns:a16="http://schemas.microsoft.com/office/drawing/2014/main" id="{620E5344-1AA0-4CA2-A820-CE616ED7A235}"/>
+                <a16:creationId xmlns:a16="http://schemas.microsoft.com/office/drawing/2014/main" xmlns="" id="{620E5344-1AA0-4CA2-A820-CE616ED7A235}"/>
               </a:ext>
             </a:extLst>
           </p:cNvPr>
@@ -5934,7 +5955,7 @@
           <p:cNvPr id="69" name="Straight Arrow Connector 68">
             <a:extLst>
               <a:ext uri="{FF2B5EF4-FFF2-40B4-BE49-F238E27FC236}">
-                <a16:creationId xmlns:a16="http://schemas.microsoft.com/office/drawing/2014/main" id="{1C29C114-0B87-4702-8014-3947DD4C4828}"/>
+                <a16:creationId xmlns:a16="http://schemas.microsoft.com/office/drawing/2014/main" xmlns="" id="{1C29C114-0B87-4702-8014-3947DD4C4828}"/>
               </a:ext>
             </a:extLst>
           </p:cNvPr>
@@ -5976,7 +5997,7 @@
           <p:cNvPr id="70" name="TextBox 69">
             <a:extLst>
               <a:ext uri="{FF2B5EF4-FFF2-40B4-BE49-F238E27FC236}">
-                <a16:creationId xmlns:a16="http://schemas.microsoft.com/office/drawing/2014/main" id="{2B856B3F-C4A8-4595-A50C-16E8B2ABAE4A}"/>
+                <a16:creationId xmlns:a16="http://schemas.microsoft.com/office/drawing/2014/main" xmlns="" id="{2B856B3F-C4A8-4595-A50C-16E8B2ABAE4A}"/>
               </a:ext>
             </a:extLst>
           </p:cNvPr>
@@ -6025,7 +6046,7 @@
           <p:cNvPr id="71" name="TextBox 70">
             <a:extLst>
               <a:ext uri="{FF2B5EF4-FFF2-40B4-BE49-F238E27FC236}">
-                <a16:creationId xmlns:a16="http://schemas.microsoft.com/office/drawing/2014/main" id="{089F75D9-FD4E-42EF-9ADC-85BD0242BD8B}"/>
+                <a16:creationId xmlns:a16="http://schemas.microsoft.com/office/drawing/2014/main" xmlns="" id="{089F75D9-FD4E-42EF-9ADC-85BD0242BD8B}"/>
               </a:ext>
             </a:extLst>
           </p:cNvPr>
@@ -6078,7 +6099,7 @@
           <p:cNvPr id="72" name="Straight Arrow Connector 71">
             <a:extLst>
               <a:ext uri="{FF2B5EF4-FFF2-40B4-BE49-F238E27FC236}">
-                <a16:creationId xmlns:a16="http://schemas.microsoft.com/office/drawing/2014/main" id="{34CD601C-5F30-42E1-B007-E8FA142C807F}"/>
+                <a16:creationId xmlns:a16="http://schemas.microsoft.com/office/drawing/2014/main" xmlns="" id="{34CD601C-5F30-42E1-B007-E8FA142C807F}"/>
               </a:ext>
             </a:extLst>
           </p:cNvPr>
@@ -6120,7 +6141,7 @@
           <p:cNvPr id="73" name="Straight Arrow Connector 72">
             <a:extLst>
               <a:ext uri="{FF2B5EF4-FFF2-40B4-BE49-F238E27FC236}">
-                <a16:creationId xmlns:a16="http://schemas.microsoft.com/office/drawing/2014/main" id="{37E3B069-1F2E-4861-B180-FD8A882741F1}"/>
+                <a16:creationId xmlns:a16="http://schemas.microsoft.com/office/drawing/2014/main" xmlns="" id="{37E3B069-1F2E-4861-B180-FD8A882741F1}"/>
               </a:ext>
             </a:extLst>
           </p:cNvPr>
@@ -6162,7 +6183,7 @@
           <p:cNvPr id="74" name="Straight Arrow Connector 73">
             <a:extLst>
               <a:ext uri="{FF2B5EF4-FFF2-40B4-BE49-F238E27FC236}">
-                <a16:creationId xmlns:a16="http://schemas.microsoft.com/office/drawing/2014/main" id="{4D5574A7-9394-49BB-9740-D3A89C3AFD64}"/>
+                <a16:creationId xmlns:a16="http://schemas.microsoft.com/office/drawing/2014/main" xmlns="" id="{4D5574A7-9394-49BB-9740-D3A89C3AFD64}"/>
               </a:ext>
             </a:extLst>
           </p:cNvPr>
@@ -6204,7 +6225,7 @@
           <p:cNvPr id="75" name="Straight Arrow Connector 74">
             <a:extLst>
               <a:ext uri="{FF2B5EF4-FFF2-40B4-BE49-F238E27FC236}">
-                <a16:creationId xmlns:a16="http://schemas.microsoft.com/office/drawing/2014/main" id="{5E4B54F9-36B6-4B8A-8386-783F172A2B2C}"/>
+                <a16:creationId xmlns:a16="http://schemas.microsoft.com/office/drawing/2014/main" xmlns="" id="{5E4B54F9-36B6-4B8A-8386-783F172A2B2C}"/>
               </a:ext>
             </a:extLst>
           </p:cNvPr>
@@ -6246,7 +6267,7 @@
           <p:cNvPr id="76" name="TextBox 75">
             <a:extLst>
               <a:ext uri="{FF2B5EF4-FFF2-40B4-BE49-F238E27FC236}">
-                <a16:creationId xmlns:a16="http://schemas.microsoft.com/office/drawing/2014/main" id="{05131181-1404-42A8-B79C-C98EAAFD1F0B}"/>
+                <a16:creationId xmlns:a16="http://schemas.microsoft.com/office/drawing/2014/main" xmlns="" id="{05131181-1404-42A8-B79C-C98EAAFD1F0B}"/>
               </a:ext>
             </a:extLst>
           </p:cNvPr>
@@ -6295,7 +6316,7 @@
           <p:cNvPr id="77" name="TextBox 76">
             <a:extLst>
               <a:ext uri="{FF2B5EF4-FFF2-40B4-BE49-F238E27FC236}">
-                <a16:creationId xmlns:a16="http://schemas.microsoft.com/office/drawing/2014/main" id="{022A2E03-4F84-4521-B5AC-2A5D852E5F59}"/>
+                <a16:creationId xmlns:a16="http://schemas.microsoft.com/office/drawing/2014/main" xmlns="" id="{022A2E03-4F84-4521-B5AC-2A5D852E5F59}"/>
               </a:ext>
             </a:extLst>
           </p:cNvPr>
@@ -6344,7 +6365,7 @@
           <p:cNvPr id="78" name="TextBox 77">
             <a:extLst>
               <a:ext uri="{FF2B5EF4-FFF2-40B4-BE49-F238E27FC236}">
-                <a16:creationId xmlns:a16="http://schemas.microsoft.com/office/drawing/2014/main" id="{8D4C2514-30B1-4C7E-812A-9BE07041DA72}"/>
+                <a16:creationId xmlns:a16="http://schemas.microsoft.com/office/drawing/2014/main" xmlns="" id="{8D4C2514-30B1-4C7E-812A-9BE07041DA72}"/>
               </a:ext>
             </a:extLst>
           </p:cNvPr>
@@ -6393,7 +6414,7 @@
           <p:cNvPr id="79" name="TextBox 78">
             <a:extLst>
               <a:ext uri="{FF2B5EF4-FFF2-40B4-BE49-F238E27FC236}">
-                <a16:creationId xmlns:a16="http://schemas.microsoft.com/office/drawing/2014/main" id="{757B4285-51AD-4743-8D4C-C630D18DC23C}"/>
+                <a16:creationId xmlns:a16="http://schemas.microsoft.com/office/drawing/2014/main" xmlns="" id="{757B4285-51AD-4743-8D4C-C630D18DC23C}"/>
               </a:ext>
             </a:extLst>
           </p:cNvPr>
@@ -6442,7 +6463,7 @@
           <p:cNvPr id="80" name="TextBox 79">
             <a:extLst>
               <a:ext uri="{FF2B5EF4-FFF2-40B4-BE49-F238E27FC236}">
-                <a16:creationId xmlns:a16="http://schemas.microsoft.com/office/drawing/2014/main" id="{8F4CD7A3-7BAE-4C8C-B164-58CCF0A04163}"/>
+                <a16:creationId xmlns:a16="http://schemas.microsoft.com/office/drawing/2014/main" xmlns="" id="{8F4CD7A3-7BAE-4C8C-B164-58CCF0A04163}"/>
               </a:ext>
             </a:extLst>
           </p:cNvPr>
@@ -6491,7 +6512,7 @@
           <p:cNvPr id="81" name="TextBox 80">
             <a:extLst>
               <a:ext uri="{FF2B5EF4-FFF2-40B4-BE49-F238E27FC236}">
-                <a16:creationId xmlns:a16="http://schemas.microsoft.com/office/drawing/2014/main" id="{B660D915-072D-4CE0-9208-4B2097538925}"/>
+                <a16:creationId xmlns:a16="http://schemas.microsoft.com/office/drawing/2014/main" xmlns="" id="{B660D915-072D-4CE0-9208-4B2097538925}"/>
               </a:ext>
             </a:extLst>
           </p:cNvPr>
@@ -6540,7 +6561,7 @@
           <p:cNvPr id="82" name="TextBox 81">
             <a:extLst>
               <a:ext uri="{FF2B5EF4-FFF2-40B4-BE49-F238E27FC236}">
-                <a16:creationId xmlns:a16="http://schemas.microsoft.com/office/drawing/2014/main" id="{821F3225-6094-4B24-9C27-DD15EFCA6C44}"/>
+                <a16:creationId xmlns:a16="http://schemas.microsoft.com/office/drawing/2014/main" xmlns="" id="{821F3225-6094-4B24-9C27-DD15EFCA6C44}"/>
               </a:ext>
             </a:extLst>
           </p:cNvPr>
@@ -6550,7 +6571,7 @@
         <p:spPr>
           <a:xfrm>
             <a:off x="646399" y="4362588"/>
-            <a:ext cx="10715882" cy="369332"/>
+            <a:ext cx="10816872" cy="369332"/>
           </a:xfrm>
           <a:prstGeom prst="rect">
             <a:avLst/>
@@ -6565,7 +6586,23 @@
           <a:p>
             <a:r>
               <a:rPr lang="en-GB" dirty="0"/>
-              <a:t> Pairwise comparison of two treatments or conditions, with no biological replicates, three technical replicates. </a:t>
+              <a:t> Pairwise comparison of two treatments or conditions, with </a:t>
+            </a:r>
+            <a:r>
+              <a:rPr lang="en-GB" dirty="0" smtClean="0"/>
+              <a:t>three </a:t>
+            </a:r>
+            <a:r>
+              <a:rPr lang="en-GB" dirty="0"/>
+              <a:t>biological </a:t>
+            </a:r>
+            <a:r>
+              <a:rPr lang="en-GB" dirty="0" smtClean="0"/>
+              <a:t>replicates and no technical </a:t>
+            </a:r>
+            <a:r>
+              <a:rPr lang="en-GB" dirty="0"/>
+              <a:t>replicates. </a:t>
             </a:r>
           </a:p>
         </p:txBody>
@@ -6575,7 +6612,7 @@
           <p:cNvPr id="84" name="TextBox 83">
             <a:extLst>
               <a:ext uri="{FF2B5EF4-FFF2-40B4-BE49-F238E27FC236}">
-                <a16:creationId xmlns:a16="http://schemas.microsoft.com/office/drawing/2014/main" id="{7DFFFC7A-061B-4319-94D9-9899227F3245}"/>
+                <a16:creationId xmlns:a16="http://schemas.microsoft.com/office/drawing/2014/main" xmlns="" id="{7DFFFC7A-061B-4319-94D9-9899227F3245}"/>
               </a:ext>
             </a:extLst>
           </p:cNvPr>
@@ -6610,7 +6647,7 @@
           <p:cNvPr id="85" name="TextBox 84">
             <a:extLst>
               <a:ext uri="{FF2B5EF4-FFF2-40B4-BE49-F238E27FC236}">
-                <a16:creationId xmlns:a16="http://schemas.microsoft.com/office/drawing/2014/main" id="{96AE48C5-8FB9-473F-985E-A50BD707B8DB}"/>
+                <a16:creationId xmlns:a16="http://schemas.microsoft.com/office/drawing/2014/main" xmlns="" id="{96AE48C5-8FB9-473F-985E-A50BD707B8DB}"/>
               </a:ext>
             </a:extLst>
           </p:cNvPr>
@@ -6645,7 +6682,7 @@
           <p:cNvPr id="86" name="TextBox 85">
             <a:extLst>
               <a:ext uri="{FF2B5EF4-FFF2-40B4-BE49-F238E27FC236}">
-                <a16:creationId xmlns:a16="http://schemas.microsoft.com/office/drawing/2014/main" id="{D5FFBE7D-5E61-4430-AF7E-7F65D318CF7D}"/>
+                <a16:creationId xmlns:a16="http://schemas.microsoft.com/office/drawing/2014/main" xmlns="" id="{D5FFBE7D-5E61-4430-AF7E-7F65D318CF7D}"/>
               </a:ext>
             </a:extLst>
           </p:cNvPr>
@@ -6680,7 +6717,7 @@
           <p:cNvPr id="87" name="TextBox 86">
             <a:extLst>
               <a:ext uri="{FF2B5EF4-FFF2-40B4-BE49-F238E27FC236}">
-                <a16:creationId xmlns:a16="http://schemas.microsoft.com/office/drawing/2014/main" id="{28E242D5-B4F3-4B4F-B5A0-061D34EB0578}"/>
+                <a16:creationId xmlns:a16="http://schemas.microsoft.com/office/drawing/2014/main" xmlns="" id="{28E242D5-B4F3-4B4F-B5A0-061D34EB0578}"/>
               </a:ext>
             </a:extLst>
           </p:cNvPr>
@@ -6712,10 +6749,10 @@
       </p:sp>
       <p:sp>
         <p:nvSpPr>
-          <p:cNvPr id="88" name="TextBox 87">
-            <a:extLst>
-              <a:ext uri="{FF2B5EF4-FFF2-40B4-BE49-F238E27FC236}">
-                <a16:creationId xmlns:a16="http://schemas.microsoft.com/office/drawing/2014/main" id="{63151A96-B412-479E-B3FF-18D0D73EC934}"/>
+          <p:cNvPr id="89" name="TextBox 88">
+            <a:extLst>
+              <a:ext uri="{FF2B5EF4-FFF2-40B4-BE49-F238E27FC236}">
+                <a16:creationId xmlns:a16="http://schemas.microsoft.com/office/drawing/2014/main" xmlns="" id="{63151A96-B412-479E-B3FF-18D0D73EC934}"/>
               </a:ext>
             </a:extLst>
           </p:cNvPr>

</xml_diff>

<commit_message>
Minor fixes to spec doc and figure source
</commit_message>
<xml_diff>
--- a/specification_document-developments/1_1-Metabolomics-Draft/ExperimentalDesign.pptx
+++ b/specification_document-developments/1_1-Metabolomics-Draft/ExperimentalDesign.pptx
@@ -243,7 +243,7 @@
           <a:p>
             <a:fld id="{43520AFC-A4C0-48BF-AA6D-EADC8EADEEEB}" type="datetimeFigureOut">
               <a:rPr lang="en-GB" smtClean="0"/>
-              <a:t>17/05/2018</a:t>
+              <a:t>18/05/2018</a:t>
             </a:fld>
             <a:endParaRPr lang="en-GB"/>
           </a:p>
@@ -413,7 +413,7 @@
           <a:p>
             <a:fld id="{43520AFC-A4C0-48BF-AA6D-EADC8EADEEEB}" type="datetimeFigureOut">
               <a:rPr lang="en-GB" smtClean="0"/>
-              <a:t>17/05/2018</a:t>
+              <a:t>18/05/2018</a:t>
             </a:fld>
             <a:endParaRPr lang="en-GB"/>
           </a:p>
@@ -593,7 +593,7 @@
           <a:p>
             <a:fld id="{43520AFC-A4C0-48BF-AA6D-EADC8EADEEEB}" type="datetimeFigureOut">
               <a:rPr lang="en-GB" smtClean="0"/>
-              <a:t>17/05/2018</a:t>
+              <a:t>18/05/2018</a:t>
             </a:fld>
             <a:endParaRPr lang="en-GB"/>
           </a:p>
@@ -763,7 +763,7 @@
           <a:p>
             <a:fld id="{43520AFC-A4C0-48BF-AA6D-EADC8EADEEEB}" type="datetimeFigureOut">
               <a:rPr lang="en-GB" smtClean="0"/>
-              <a:t>17/05/2018</a:t>
+              <a:t>18/05/2018</a:t>
             </a:fld>
             <a:endParaRPr lang="en-GB"/>
           </a:p>
@@ -1009,7 +1009,7 @@
           <a:p>
             <a:fld id="{43520AFC-A4C0-48BF-AA6D-EADC8EADEEEB}" type="datetimeFigureOut">
               <a:rPr lang="en-GB" smtClean="0"/>
-              <a:t>17/05/2018</a:t>
+              <a:t>18/05/2018</a:t>
             </a:fld>
             <a:endParaRPr lang="en-GB"/>
           </a:p>
@@ -1241,7 +1241,7 @@
           <a:p>
             <a:fld id="{43520AFC-A4C0-48BF-AA6D-EADC8EADEEEB}" type="datetimeFigureOut">
               <a:rPr lang="en-GB" smtClean="0"/>
-              <a:t>17/05/2018</a:t>
+              <a:t>18/05/2018</a:t>
             </a:fld>
             <a:endParaRPr lang="en-GB"/>
           </a:p>
@@ -1608,7 +1608,7 @@
           <a:p>
             <a:fld id="{43520AFC-A4C0-48BF-AA6D-EADC8EADEEEB}" type="datetimeFigureOut">
               <a:rPr lang="en-GB" smtClean="0"/>
-              <a:t>17/05/2018</a:t>
+              <a:t>18/05/2018</a:t>
             </a:fld>
             <a:endParaRPr lang="en-GB"/>
           </a:p>
@@ -1726,7 +1726,7 @@
           <a:p>
             <a:fld id="{43520AFC-A4C0-48BF-AA6D-EADC8EADEEEB}" type="datetimeFigureOut">
               <a:rPr lang="en-GB" smtClean="0"/>
-              <a:t>17/05/2018</a:t>
+              <a:t>18/05/2018</a:t>
             </a:fld>
             <a:endParaRPr lang="en-GB"/>
           </a:p>
@@ -1821,7 +1821,7 @@
           <a:p>
             <a:fld id="{43520AFC-A4C0-48BF-AA6D-EADC8EADEEEB}" type="datetimeFigureOut">
               <a:rPr lang="en-GB" smtClean="0"/>
-              <a:t>17/05/2018</a:t>
+              <a:t>18/05/2018</a:t>
             </a:fld>
             <a:endParaRPr lang="en-GB"/>
           </a:p>
@@ -2098,7 +2098,7 @@
           <a:p>
             <a:fld id="{43520AFC-A4C0-48BF-AA6D-EADC8EADEEEB}" type="datetimeFigureOut">
               <a:rPr lang="en-GB" smtClean="0"/>
-              <a:t>17/05/2018</a:t>
+              <a:t>18/05/2018</a:t>
             </a:fld>
             <a:endParaRPr lang="en-GB"/>
           </a:p>
@@ -2355,7 +2355,7 @@
           <a:p>
             <a:fld id="{43520AFC-A4C0-48BF-AA6D-EADC8EADEEEB}" type="datetimeFigureOut">
               <a:rPr lang="en-GB" smtClean="0"/>
-              <a:t>17/05/2018</a:t>
+              <a:t>18/05/2018</a:t>
             </a:fld>
             <a:endParaRPr lang="en-GB"/>
           </a:p>
@@ -2568,7 +2568,7 @@
           <a:p>
             <a:fld id="{43520AFC-A4C0-48BF-AA6D-EADC8EADEEEB}" type="datetimeFigureOut">
               <a:rPr lang="en-GB" smtClean="0"/>
-              <a:t>17/05/2018</a:t>
+              <a:t>18/05/2018</a:t>
             </a:fld>
             <a:endParaRPr lang="en-GB"/>
           </a:p>
@@ -2978,7 +2978,7 @@
           <p:cNvPr id="5" name="Straight Arrow Connector 4">
             <a:extLst>
               <a:ext uri="{FF2B5EF4-FFF2-40B4-BE49-F238E27FC236}">
-                <a16:creationId xmlns:a16="http://schemas.microsoft.com/office/drawing/2014/main" xmlns="" id="{F8307C2E-3CA8-441E-AAB1-00061E67391A}"/>
+                <a16:creationId xmlns:a16="http://schemas.microsoft.com/office/drawing/2014/main" id="{F8307C2E-3CA8-441E-AAB1-00061E67391A}"/>
               </a:ext>
             </a:extLst>
           </p:cNvPr>
@@ -3020,7 +3020,7 @@
           <p:cNvPr id="6" name="Straight Arrow Connector 5">
             <a:extLst>
               <a:ext uri="{FF2B5EF4-FFF2-40B4-BE49-F238E27FC236}">
-                <a16:creationId xmlns:a16="http://schemas.microsoft.com/office/drawing/2014/main" xmlns="" id="{2F8AC3AC-E60E-456A-9799-8BF592493131}"/>
+                <a16:creationId xmlns:a16="http://schemas.microsoft.com/office/drawing/2014/main" id="{2F8AC3AC-E60E-456A-9799-8BF592493131}"/>
               </a:ext>
             </a:extLst>
           </p:cNvPr>
@@ -3062,7 +3062,7 @@
           <p:cNvPr id="7" name="Straight Arrow Connector 6">
             <a:extLst>
               <a:ext uri="{FF2B5EF4-FFF2-40B4-BE49-F238E27FC236}">
-                <a16:creationId xmlns:a16="http://schemas.microsoft.com/office/drawing/2014/main" xmlns="" id="{A2639EDF-757B-45A7-B78D-2EBF4252A8B5}"/>
+                <a16:creationId xmlns:a16="http://schemas.microsoft.com/office/drawing/2014/main" id="{A2639EDF-757B-45A7-B78D-2EBF4252A8B5}"/>
               </a:ext>
             </a:extLst>
           </p:cNvPr>
@@ -3104,7 +3104,7 @@
           <p:cNvPr id="8" name="Straight Arrow Connector 7">
             <a:extLst>
               <a:ext uri="{FF2B5EF4-FFF2-40B4-BE49-F238E27FC236}">
-                <a16:creationId xmlns:a16="http://schemas.microsoft.com/office/drawing/2014/main" xmlns="" id="{F5D9DFEE-5CFC-4672-BD5F-E10CE89333F4}"/>
+                <a16:creationId xmlns:a16="http://schemas.microsoft.com/office/drawing/2014/main" id="{F5D9DFEE-5CFC-4672-BD5F-E10CE89333F4}"/>
               </a:ext>
             </a:extLst>
           </p:cNvPr>
@@ -3146,7 +3146,7 @@
           <p:cNvPr id="9" name="Straight Arrow Connector 8">
             <a:extLst>
               <a:ext uri="{FF2B5EF4-FFF2-40B4-BE49-F238E27FC236}">
-                <a16:creationId xmlns:a16="http://schemas.microsoft.com/office/drawing/2014/main" xmlns="" id="{926C44B1-F2FD-40CA-BFA0-8019881F8EF1}"/>
+                <a16:creationId xmlns:a16="http://schemas.microsoft.com/office/drawing/2014/main" id="{926C44B1-F2FD-40CA-BFA0-8019881F8EF1}"/>
               </a:ext>
             </a:extLst>
           </p:cNvPr>
@@ -3188,7 +3188,7 @@
           <p:cNvPr id="10" name="Straight Arrow Connector 9">
             <a:extLst>
               <a:ext uri="{FF2B5EF4-FFF2-40B4-BE49-F238E27FC236}">
-                <a16:creationId xmlns:a16="http://schemas.microsoft.com/office/drawing/2014/main" xmlns="" id="{A17F0DFD-5B6D-40A5-B83D-A6F9949FBC7E}"/>
+                <a16:creationId xmlns:a16="http://schemas.microsoft.com/office/drawing/2014/main" id="{A17F0DFD-5B6D-40A5-B83D-A6F9949FBC7E}"/>
               </a:ext>
             </a:extLst>
           </p:cNvPr>
@@ -3230,7 +3230,7 @@
           <p:cNvPr id="11" name="TextBox 10">
             <a:extLst>
               <a:ext uri="{FF2B5EF4-FFF2-40B4-BE49-F238E27FC236}">
-                <a16:creationId xmlns:a16="http://schemas.microsoft.com/office/drawing/2014/main" xmlns="" id="{E84EE83E-EDC0-45EF-9EC2-AC1B8FC478B0}"/>
+                <a16:creationId xmlns:a16="http://schemas.microsoft.com/office/drawing/2014/main" id="{E84EE83E-EDC0-45EF-9EC2-AC1B8FC478B0}"/>
               </a:ext>
             </a:extLst>
           </p:cNvPr>
@@ -3282,7 +3282,7 @@
           <p:cNvPr id="12" name="TextBox 11">
             <a:extLst>
               <a:ext uri="{FF2B5EF4-FFF2-40B4-BE49-F238E27FC236}">
-                <a16:creationId xmlns:a16="http://schemas.microsoft.com/office/drawing/2014/main" xmlns="" id="{8673BBF2-B409-4C65-AD2D-C8694D274A87}"/>
+                <a16:creationId xmlns:a16="http://schemas.microsoft.com/office/drawing/2014/main" id="{8673BBF2-B409-4C65-AD2D-C8694D274A87}"/>
               </a:ext>
             </a:extLst>
           </p:cNvPr>
@@ -3331,7 +3331,7 @@
           <p:cNvPr id="13" name="TextBox 12">
             <a:extLst>
               <a:ext uri="{FF2B5EF4-FFF2-40B4-BE49-F238E27FC236}">
-                <a16:creationId xmlns:a16="http://schemas.microsoft.com/office/drawing/2014/main" xmlns="" id="{7CEC4C55-5CF1-4983-93E9-0792C2084C3A}"/>
+                <a16:creationId xmlns:a16="http://schemas.microsoft.com/office/drawing/2014/main" id="{7CEC4C55-5CF1-4983-93E9-0792C2084C3A}"/>
               </a:ext>
             </a:extLst>
           </p:cNvPr>
@@ -3384,7 +3384,7 @@
           <p:cNvPr id="14" name="Straight Arrow Connector 13">
             <a:extLst>
               <a:ext uri="{FF2B5EF4-FFF2-40B4-BE49-F238E27FC236}">
-                <a16:creationId xmlns:a16="http://schemas.microsoft.com/office/drawing/2014/main" xmlns="" id="{17CF58A1-578D-4C1C-BFE4-2F9753E26C03}"/>
+                <a16:creationId xmlns:a16="http://schemas.microsoft.com/office/drawing/2014/main" id="{17CF58A1-578D-4C1C-BFE4-2F9753E26C03}"/>
               </a:ext>
             </a:extLst>
           </p:cNvPr>
@@ -3426,7 +3426,7 @@
           <p:cNvPr id="15" name="TextBox 14">
             <a:extLst>
               <a:ext uri="{FF2B5EF4-FFF2-40B4-BE49-F238E27FC236}">
-                <a16:creationId xmlns:a16="http://schemas.microsoft.com/office/drawing/2014/main" xmlns="" id="{5524E355-D66D-4718-8481-D0ECF147D1A5}"/>
+                <a16:creationId xmlns:a16="http://schemas.microsoft.com/office/drawing/2014/main" id="{5524E355-D66D-4718-8481-D0ECF147D1A5}"/>
               </a:ext>
             </a:extLst>
           </p:cNvPr>
@@ -3475,7 +3475,7 @@
           <p:cNvPr id="16" name="TextBox 15">
             <a:extLst>
               <a:ext uri="{FF2B5EF4-FFF2-40B4-BE49-F238E27FC236}">
-                <a16:creationId xmlns:a16="http://schemas.microsoft.com/office/drawing/2014/main" xmlns="" id="{2B28615F-7E2E-4EF7-8938-6EA14F2511C1}"/>
+                <a16:creationId xmlns:a16="http://schemas.microsoft.com/office/drawing/2014/main" id="{2B28615F-7E2E-4EF7-8938-6EA14F2511C1}"/>
               </a:ext>
             </a:extLst>
           </p:cNvPr>
@@ -3528,7 +3528,7 @@
           <p:cNvPr id="17" name="Straight Arrow Connector 16">
             <a:extLst>
               <a:ext uri="{FF2B5EF4-FFF2-40B4-BE49-F238E27FC236}">
-                <a16:creationId xmlns:a16="http://schemas.microsoft.com/office/drawing/2014/main" xmlns="" id="{668C2DE0-E826-48FD-93EA-B5DE5BD0B290}"/>
+                <a16:creationId xmlns:a16="http://schemas.microsoft.com/office/drawing/2014/main" id="{668C2DE0-E826-48FD-93EA-B5DE5BD0B290}"/>
               </a:ext>
             </a:extLst>
           </p:cNvPr>
@@ -3570,7 +3570,7 @@
           <p:cNvPr id="18" name="TextBox 17">
             <a:extLst>
               <a:ext uri="{FF2B5EF4-FFF2-40B4-BE49-F238E27FC236}">
-                <a16:creationId xmlns:a16="http://schemas.microsoft.com/office/drawing/2014/main" xmlns="" id="{159402A0-0DED-4652-97D9-8608F6E9C87A}"/>
+                <a16:creationId xmlns:a16="http://schemas.microsoft.com/office/drawing/2014/main" id="{159402A0-0DED-4652-97D9-8608F6E9C87A}"/>
               </a:ext>
             </a:extLst>
           </p:cNvPr>
@@ -3619,7 +3619,7 @@
           <p:cNvPr id="19" name="TextBox 18">
             <a:extLst>
               <a:ext uri="{FF2B5EF4-FFF2-40B4-BE49-F238E27FC236}">
-                <a16:creationId xmlns:a16="http://schemas.microsoft.com/office/drawing/2014/main" xmlns="" id="{2A25259E-7CEC-49C9-A733-5694DC9D7264}"/>
+                <a16:creationId xmlns:a16="http://schemas.microsoft.com/office/drawing/2014/main" id="{2A25259E-7CEC-49C9-A733-5694DC9D7264}"/>
               </a:ext>
             </a:extLst>
           </p:cNvPr>
@@ -3672,7 +3672,7 @@
           <p:cNvPr id="20" name="Straight Arrow Connector 19">
             <a:extLst>
               <a:ext uri="{FF2B5EF4-FFF2-40B4-BE49-F238E27FC236}">
-                <a16:creationId xmlns:a16="http://schemas.microsoft.com/office/drawing/2014/main" xmlns="" id="{2114A1FE-9D53-47F1-B568-394DB3EA6E03}"/>
+                <a16:creationId xmlns:a16="http://schemas.microsoft.com/office/drawing/2014/main" id="{2114A1FE-9D53-47F1-B568-394DB3EA6E03}"/>
               </a:ext>
             </a:extLst>
           </p:cNvPr>
@@ -3714,7 +3714,7 @@
           <p:cNvPr id="21" name="Straight Arrow Connector 20">
             <a:extLst>
               <a:ext uri="{FF2B5EF4-FFF2-40B4-BE49-F238E27FC236}">
-                <a16:creationId xmlns:a16="http://schemas.microsoft.com/office/drawing/2014/main" xmlns="" id="{80DA5C63-E51D-48BF-A9BB-FAECB8F0BB54}"/>
+                <a16:creationId xmlns:a16="http://schemas.microsoft.com/office/drawing/2014/main" id="{80DA5C63-E51D-48BF-A9BB-FAECB8F0BB54}"/>
               </a:ext>
             </a:extLst>
           </p:cNvPr>
@@ -3756,7 +3756,7 @@
           <p:cNvPr id="22" name="Straight Arrow Connector 21">
             <a:extLst>
               <a:ext uri="{FF2B5EF4-FFF2-40B4-BE49-F238E27FC236}">
-                <a16:creationId xmlns:a16="http://schemas.microsoft.com/office/drawing/2014/main" xmlns="" id="{5A70EE8B-07C2-4883-957F-679BD9FD95F7}"/>
+                <a16:creationId xmlns:a16="http://schemas.microsoft.com/office/drawing/2014/main" id="{5A70EE8B-07C2-4883-957F-679BD9FD95F7}"/>
               </a:ext>
             </a:extLst>
           </p:cNvPr>
@@ -3798,7 +3798,7 @@
           <p:cNvPr id="23" name="Straight Arrow Connector 22">
             <a:extLst>
               <a:ext uri="{FF2B5EF4-FFF2-40B4-BE49-F238E27FC236}">
-                <a16:creationId xmlns:a16="http://schemas.microsoft.com/office/drawing/2014/main" xmlns="" id="{0450A24E-B1E8-4608-ACA8-FE59190A0167}"/>
+                <a16:creationId xmlns:a16="http://schemas.microsoft.com/office/drawing/2014/main" id="{0450A24E-B1E8-4608-ACA8-FE59190A0167}"/>
               </a:ext>
             </a:extLst>
           </p:cNvPr>
@@ -3840,7 +3840,7 @@
           <p:cNvPr id="24" name="TextBox 23">
             <a:extLst>
               <a:ext uri="{FF2B5EF4-FFF2-40B4-BE49-F238E27FC236}">
-                <a16:creationId xmlns:a16="http://schemas.microsoft.com/office/drawing/2014/main" xmlns="" id="{B4070D1E-1C02-4B54-AADA-1002EF6E482D}"/>
+                <a16:creationId xmlns:a16="http://schemas.microsoft.com/office/drawing/2014/main" id="{B4070D1E-1C02-4B54-AADA-1002EF6E482D}"/>
               </a:ext>
             </a:extLst>
           </p:cNvPr>
@@ -3892,7 +3892,7 @@
           <p:cNvPr id="25" name="TextBox 24">
             <a:extLst>
               <a:ext uri="{FF2B5EF4-FFF2-40B4-BE49-F238E27FC236}">
-                <a16:creationId xmlns:a16="http://schemas.microsoft.com/office/drawing/2014/main" xmlns="" id="{14C1C98A-CED4-4AE0-922F-41BC3B7D25BB}"/>
+                <a16:creationId xmlns:a16="http://schemas.microsoft.com/office/drawing/2014/main" id="{14C1C98A-CED4-4AE0-922F-41BC3B7D25BB}"/>
               </a:ext>
             </a:extLst>
           </p:cNvPr>
@@ -3941,7 +3941,7 @@
           <p:cNvPr id="26" name="TextBox 25">
             <a:extLst>
               <a:ext uri="{FF2B5EF4-FFF2-40B4-BE49-F238E27FC236}">
-                <a16:creationId xmlns:a16="http://schemas.microsoft.com/office/drawing/2014/main" xmlns="" id="{181642B3-048B-4362-9729-756E41234777}"/>
+                <a16:creationId xmlns:a16="http://schemas.microsoft.com/office/drawing/2014/main" id="{181642B3-048B-4362-9729-756E41234777}"/>
               </a:ext>
             </a:extLst>
           </p:cNvPr>
@@ -3994,7 +3994,7 @@
           <p:cNvPr id="27" name="Straight Arrow Connector 26">
             <a:extLst>
               <a:ext uri="{FF2B5EF4-FFF2-40B4-BE49-F238E27FC236}">
-                <a16:creationId xmlns:a16="http://schemas.microsoft.com/office/drawing/2014/main" xmlns="" id="{6564E5E1-2B35-4A7C-9EE0-80AEAC1F309A}"/>
+                <a16:creationId xmlns:a16="http://schemas.microsoft.com/office/drawing/2014/main" id="{6564E5E1-2B35-4A7C-9EE0-80AEAC1F309A}"/>
               </a:ext>
             </a:extLst>
           </p:cNvPr>
@@ -4036,7 +4036,7 @@
           <p:cNvPr id="28" name="TextBox 27">
             <a:extLst>
               <a:ext uri="{FF2B5EF4-FFF2-40B4-BE49-F238E27FC236}">
-                <a16:creationId xmlns:a16="http://schemas.microsoft.com/office/drawing/2014/main" xmlns="" id="{36A6C2C4-D180-4434-9517-3CF1DA92C105}"/>
+                <a16:creationId xmlns:a16="http://schemas.microsoft.com/office/drawing/2014/main" id="{36A6C2C4-D180-4434-9517-3CF1DA92C105}"/>
               </a:ext>
             </a:extLst>
           </p:cNvPr>
@@ -4085,7 +4085,7 @@
           <p:cNvPr id="29" name="TextBox 28">
             <a:extLst>
               <a:ext uri="{FF2B5EF4-FFF2-40B4-BE49-F238E27FC236}">
-                <a16:creationId xmlns:a16="http://schemas.microsoft.com/office/drawing/2014/main" xmlns="" id="{27548BD1-B9A0-46A4-90EE-5A9FB35108F5}"/>
+                <a16:creationId xmlns:a16="http://schemas.microsoft.com/office/drawing/2014/main" id="{27548BD1-B9A0-46A4-90EE-5A9FB35108F5}"/>
               </a:ext>
             </a:extLst>
           </p:cNvPr>
@@ -4138,7 +4138,7 @@
           <p:cNvPr id="30" name="Straight Arrow Connector 29">
             <a:extLst>
               <a:ext uri="{FF2B5EF4-FFF2-40B4-BE49-F238E27FC236}">
-                <a16:creationId xmlns:a16="http://schemas.microsoft.com/office/drawing/2014/main" xmlns="" id="{CEA12D14-7A90-4B43-BC6C-B46630CCDD15}"/>
+                <a16:creationId xmlns:a16="http://schemas.microsoft.com/office/drawing/2014/main" id="{CEA12D14-7A90-4B43-BC6C-B46630CCDD15}"/>
               </a:ext>
             </a:extLst>
           </p:cNvPr>
@@ -4180,7 +4180,7 @@
           <p:cNvPr id="31" name="TextBox 30">
             <a:extLst>
               <a:ext uri="{FF2B5EF4-FFF2-40B4-BE49-F238E27FC236}">
-                <a16:creationId xmlns:a16="http://schemas.microsoft.com/office/drawing/2014/main" xmlns="" id="{4C324F9F-F30C-440D-A6FB-30629CC8EE83}"/>
+                <a16:creationId xmlns:a16="http://schemas.microsoft.com/office/drawing/2014/main" id="{4C324F9F-F30C-440D-A6FB-30629CC8EE83}"/>
               </a:ext>
             </a:extLst>
           </p:cNvPr>
@@ -4229,7 +4229,7 @@
           <p:cNvPr id="32" name="TextBox 31">
             <a:extLst>
               <a:ext uri="{FF2B5EF4-FFF2-40B4-BE49-F238E27FC236}">
-                <a16:creationId xmlns:a16="http://schemas.microsoft.com/office/drawing/2014/main" xmlns="" id="{A93539A6-176C-4B81-BAB6-25F32D11A89A}"/>
+                <a16:creationId xmlns:a16="http://schemas.microsoft.com/office/drawing/2014/main" id="{A93539A6-176C-4B81-BAB6-25F32D11A89A}"/>
               </a:ext>
             </a:extLst>
           </p:cNvPr>
@@ -4282,7 +4282,7 @@
           <p:cNvPr id="33" name="Straight Arrow Connector 32">
             <a:extLst>
               <a:ext uri="{FF2B5EF4-FFF2-40B4-BE49-F238E27FC236}">
-                <a16:creationId xmlns:a16="http://schemas.microsoft.com/office/drawing/2014/main" xmlns="" id="{4C99410D-C396-4695-BC1D-EF536BFB40C2}"/>
+                <a16:creationId xmlns:a16="http://schemas.microsoft.com/office/drawing/2014/main" id="{4C99410D-C396-4695-BC1D-EF536BFB40C2}"/>
               </a:ext>
             </a:extLst>
           </p:cNvPr>
@@ -4324,7 +4324,7 @@
           <p:cNvPr id="34" name="Straight Arrow Connector 33">
             <a:extLst>
               <a:ext uri="{FF2B5EF4-FFF2-40B4-BE49-F238E27FC236}">
-                <a16:creationId xmlns:a16="http://schemas.microsoft.com/office/drawing/2014/main" xmlns="" id="{1DD73768-97C0-44C8-BBEC-2AE6ECDF03C8}"/>
+                <a16:creationId xmlns:a16="http://schemas.microsoft.com/office/drawing/2014/main" id="{1DD73768-97C0-44C8-BBEC-2AE6ECDF03C8}"/>
               </a:ext>
             </a:extLst>
           </p:cNvPr>
@@ -4366,7 +4366,7 @@
           <p:cNvPr id="35" name="Straight Arrow Connector 34">
             <a:extLst>
               <a:ext uri="{FF2B5EF4-FFF2-40B4-BE49-F238E27FC236}">
-                <a16:creationId xmlns:a16="http://schemas.microsoft.com/office/drawing/2014/main" xmlns="" id="{64370FB0-2AF8-4DDF-96F2-C52F5DA96BE2}"/>
+                <a16:creationId xmlns:a16="http://schemas.microsoft.com/office/drawing/2014/main" id="{64370FB0-2AF8-4DDF-96F2-C52F5DA96BE2}"/>
               </a:ext>
             </a:extLst>
           </p:cNvPr>
@@ -4408,7 +4408,7 @@
           <p:cNvPr id="36" name="Straight Arrow Connector 35">
             <a:extLst>
               <a:ext uri="{FF2B5EF4-FFF2-40B4-BE49-F238E27FC236}">
-                <a16:creationId xmlns:a16="http://schemas.microsoft.com/office/drawing/2014/main" xmlns="" id="{C8575D11-7D63-4FA7-8CFC-6374C24DC4D5}"/>
+                <a16:creationId xmlns:a16="http://schemas.microsoft.com/office/drawing/2014/main" id="{C8575D11-7D63-4FA7-8CFC-6374C24DC4D5}"/>
               </a:ext>
             </a:extLst>
           </p:cNvPr>
@@ -4450,7 +4450,7 @@
           <p:cNvPr id="37" name="TextBox 36">
             <a:extLst>
               <a:ext uri="{FF2B5EF4-FFF2-40B4-BE49-F238E27FC236}">
-                <a16:creationId xmlns:a16="http://schemas.microsoft.com/office/drawing/2014/main" xmlns="" id="{DFCDEA84-06DF-45B8-A013-43A4A06CD5FA}"/>
+                <a16:creationId xmlns:a16="http://schemas.microsoft.com/office/drawing/2014/main" id="{DFCDEA84-06DF-45B8-A013-43A4A06CD5FA}"/>
               </a:ext>
             </a:extLst>
           </p:cNvPr>
@@ -4499,7 +4499,7 @@
           <p:cNvPr id="38" name="TextBox 37">
             <a:extLst>
               <a:ext uri="{FF2B5EF4-FFF2-40B4-BE49-F238E27FC236}">
-                <a16:creationId xmlns:a16="http://schemas.microsoft.com/office/drawing/2014/main" xmlns="" id="{1B1BB403-C342-4020-80F8-C4EAEF61C2B5}"/>
+                <a16:creationId xmlns:a16="http://schemas.microsoft.com/office/drawing/2014/main" id="{1B1BB403-C342-4020-80F8-C4EAEF61C2B5}"/>
               </a:ext>
             </a:extLst>
           </p:cNvPr>
@@ -4548,7 +4548,7 @@
           <p:cNvPr id="39" name="TextBox 38">
             <a:extLst>
               <a:ext uri="{FF2B5EF4-FFF2-40B4-BE49-F238E27FC236}">
-                <a16:creationId xmlns:a16="http://schemas.microsoft.com/office/drawing/2014/main" xmlns="" id="{45652E6A-B15A-4051-BD1D-0FBBD5EB8002}"/>
+                <a16:creationId xmlns:a16="http://schemas.microsoft.com/office/drawing/2014/main" id="{45652E6A-B15A-4051-BD1D-0FBBD5EB8002}"/>
               </a:ext>
             </a:extLst>
           </p:cNvPr>
@@ -4597,7 +4597,7 @@
           <p:cNvPr id="40" name="TextBox 39">
             <a:extLst>
               <a:ext uri="{FF2B5EF4-FFF2-40B4-BE49-F238E27FC236}">
-                <a16:creationId xmlns:a16="http://schemas.microsoft.com/office/drawing/2014/main" xmlns="" id="{8AAD8524-497F-4E72-BC9B-7F55792FB9A7}"/>
+                <a16:creationId xmlns:a16="http://schemas.microsoft.com/office/drawing/2014/main" id="{8AAD8524-497F-4E72-BC9B-7F55792FB9A7}"/>
               </a:ext>
             </a:extLst>
           </p:cNvPr>
@@ -4646,7 +4646,7 @@
           <p:cNvPr id="41" name="TextBox 40">
             <a:extLst>
               <a:ext uri="{FF2B5EF4-FFF2-40B4-BE49-F238E27FC236}">
-                <a16:creationId xmlns:a16="http://schemas.microsoft.com/office/drawing/2014/main" xmlns="" id="{8FC477CC-E11B-4726-A67E-6FD6CEBED709}"/>
+                <a16:creationId xmlns:a16="http://schemas.microsoft.com/office/drawing/2014/main" id="{8FC477CC-E11B-4726-A67E-6FD6CEBED709}"/>
               </a:ext>
             </a:extLst>
           </p:cNvPr>
@@ -4695,7 +4695,7 @@
           <p:cNvPr id="42" name="TextBox 41">
             <a:extLst>
               <a:ext uri="{FF2B5EF4-FFF2-40B4-BE49-F238E27FC236}">
-                <a16:creationId xmlns:a16="http://schemas.microsoft.com/office/drawing/2014/main" xmlns="" id="{B5DC7611-CCCD-477D-B7D1-8F2E241267EF}"/>
+                <a16:creationId xmlns:a16="http://schemas.microsoft.com/office/drawing/2014/main" id="{B5DC7611-CCCD-477D-B7D1-8F2E241267EF}"/>
               </a:ext>
             </a:extLst>
           </p:cNvPr>
@@ -4744,7 +4744,7 @@
           <p:cNvPr id="43" name="TextBox 42">
             <a:extLst>
               <a:ext uri="{FF2B5EF4-FFF2-40B4-BE49-F238E27FC236}">
-                <a16:creationId xmlns:a16="http://schemas.microsoft.com/office/drawing/2014/main" xmlns="" id="{7A0D3565-081F-483E-938A-85C857AD4ABE}"/>
+                <a16:creationId xmlns:a16="http://schemas.microsoft.com/office/drawing/2014/main" id="{7A0D3565-081F-483E-938A-85C857AD4ABE}"/>
               </a:ext>
             </a:extLst>
           </p:cNvPr>
@@ -4795,7 +4795,7 @@
           <p:cNvPr id="44" name="Straight Arrow Connector 43">
             <a:extLst>
               <a:ext uri="{FF2B5EF4-FFF2-40B4-BE49-F238E27FC236}">
-                <a16:creationId xmlns:a16="http://schemas.microsoft.com/office/drawing/2014/main" xmlns="" id="{A37C1A0C-A307-49E8-84D3-C64C60041FC2}"/>
+                <a16:creationId xmlns:a16="http://schemas.microsoft.com/office/drawing/2014/main" id="{A37C1A0C-A307-49E8-84D3-C64C60041FC2}"/>
               </a:ext>
             </a:extLst>
           </p:cNvPr>
@@ -4837,7 +4837,7 @@
           <p:cNvPr id="45" name="Straight Arrow Connector 44">
             <a:extLst>
               <a:ext uri="{FF2B5EF4-FFF2-40B4-BE49-F238E27FC236}">
-                <a16:creationId xmlns:a16="http://schemas.microsoft.com/office/drawing/2014/main" xmlns="" id="{E50540E4-1A33-4A33-84DE-67321A615DCA}"/>
+                <a16:creationId xmlns:a16="http://schemas.microsoft.com/office/drawing/2014/main" id="{E50540E4-1A33-4A33-84DE-67321A615DCA}"/>
               </a:ext>
             </a:extLst>
           </p:cNvPr>
@@ -4879,7 +4879,7 @@
           <p:cNvPr id="46" name="Straight Arrow Connector 45">
             <a:extLst>
               <a:ext uri="{FF2B5EF4-FFF2-40B4-BE49-F238E27FC236}">
-                <a16:creationId xmlns:a16="http://schemas.microsoft.com/office/drawing/2014/main" xmlns="" id="{C5C2F138-F9EE-4772-95CD-32286E8A9E94}"/>
+                <a16:creationId xmlns:a16="http://schemas.microsoft.com/office/drawing/2014/main" id="{C5C2F138-F9EE-4772-95CD-32286E8A9E94}"/>
               </a:ext>
             </a:extLst>
           </p:cNvPr>
@@ -4921,7 +4921,7 @@
           <p:cNvPr id="47" name="Straight Arrow Connector 46">
             <a:extLst>
               <a:ext uri="{FF2B5EF4-FFF2-40B4-BE49-F238E27FC236}">
-                <a16:creationId xmlns:a16="http://schemas.microsoft.com/office/drawing/2014/main" xmlns="" id="{FF480010-A42D-4880-A199-0EF55FA06A2B}"/>
+                <a16:creationId xmlns:a16="http://schemas.microsoft.com/office/drawing/2014/main" id="{FF480010-A42D-4880-A199-0EF55FA06A2B}"/>
               </a:ext>
             </a:extLst>
           </p:cNvPr>
@@ -4963,7 +4963,7 @@
           <p:cNvPr id="48" name="Straight Arrow Connector 47">
             <a:extLst>
               <a:ext uri="{FF2B5EF4-FFF2-40B4-BE49-F238E27FC236}">
-                <a16:creationId xmlns:a16="http://schemas.microsoft.com/office/drawing/2014/main" xmlns="" id="{2BD04A6A-0110-4413-A931-001EE72AEDC0}"/>
+                <a16:creationId xmlns:a16="http://schemas.microsoft.com/office/drawing/2014/main" id="{2BD04A6A-0110-4413-A931-001EE72AEDC0}"/>
               </a:ext>
             </a:extLst>
           </p:cNvPr>
@@ -5005,7 +5005,7 @@
           <p:cNvPr id="49" name="Straight Arrow Connector 48">
             <a:extLst>
               <a:ext uri="{FF2B5EF4-FFF2-40B4-BE49-F238E27FC236}">
-                <a16:creationId xmlns:a16="http://schemas.microsoft.com/office/drawing/2014/main" xmlns="" id="{E36F1D74-8A46-4684-9CB7-1F026A9BC090}"/>
+                <a16:creationId xmlns:a16="http://schemas.microsoft.com/office/drawing/2014/main" id="{E36F1D74-8A46-4684-9CB7-1F026A9BC090}"/>
               </a:ext>
             </a:extLst>
           </p:cNvPr>
@@ -5047,7 +5047,7 @@
           <p:cNvPr id="50" name="TextBox 49">
             <a:extLst>
               <a:ext uri="{FF2B5EF4-FFF2-40B4-BE49-F238E27FC236}">
-                <a16:creationId xmlns:a16="http://schemas.microsoft.com/office/drawing/2014/main" xmlns="" id="{EAE49F8D-2075-4A00-B31D-604946ABBF81}"/>
+                <a16:creationId xmlns:a16="http://schemas.microsoft.com/office/drawing/2014/main" id="{EAE49F8D-2075-4A00-B31D-604946ABBF81}"/>
               </a:ext>
             </a:extLst>
           </p:cNvPr>
@@ -5099,7 +5099,7 @@
           <p:cNvPr id="51" name="TextBox 50">
             <a:extLst>
               <a:ext uri="{FF2B5EF4-FFF2-40B4-BE49-F238E27FC236}">
-                <a16:creationId xmlns:a16="http://schemas.microsoft.com/office/drawing/2014/main" xmlns="" id="{DB53FC55-DDB0-41F4-8B11-E5C8CCCBA607}"/>
+                <a16:creationId xmlns:a16="http://schemas.microsoft.com/office/drawing/2014/main" id="{DB53FC55-DDB0-41F4-8B11-E5C8CCCBA607}"/>
               </a:ext>
             </a:extLst>
           </p:cNvPr>
@@ -5148,7 +5148,7 @@
           <p:cNvPr id="52" name="TextBox 51">
             <a:extLst>
               <a:ext uri="{FF2B5EF4-FFF2-40B4-BE49-F238E27FC236}">
-                <a16:creationId xmlns:a16="http://schemas.microsoft.com/office/drawing/2014/main" xmlns="" id="{EECB5C90-47D3-4C54-B4DB-5E7302D2E8C5}"/>
+                <a16:creationId xmlns:a16="http://schemas.microsoft.com/office/drawing/2014/main" id="{EECB5C90-47D3-4C54-B4DB-5E7302D2E8C5}"/>
               </a:ext>
             </a:extLst>
           </p:cNvPr>
@@ -5201,7 +5201,7 @@
           <p:cNvPr id="53" name="Straight Arrow Connector 52">
             <a:extLst>
               <a:ext uri="{FF2B5EF4-FFF2-40B4-BE49-F238E27FC236}">
-                <a16:creationId xmlns:a16="http://schemas.microsoft.com/office/drawing/2014/main" xmlns="" id="{F27D3A3C-C8A7-4E6F-A47B-E1B180B7349E}"/>
+                <a16:creationId xmlns:a16="http://schemas.microsoft.com/office/drawing/2014/main" id="{F27D3A3C-C8A7-4E6F-A47B-E1B180B7349E}"/>
               </a:ext>
             </a:extLst>
           </p:cNvPr>
@@ -5243,7 +5243,7 @@
           <p:cNvPr id="54" name="TextBox 53">
             <a:extLst>
               <a:ext uri="{FF2B5EF4-FFF2-40B4-BE49-F238E27FC236}">
-                <a16:creationId xmlns:a16="http://schemas.microsoft.com/office/drawing/2014/main" xmlns="" id="{F06AA69C-6CDD-4A40-8984-C93353FCDFE9}"/>
+                <a16:creationId xmlns:a16="http://schemas.microsoft.com/office/drawing/2014/main" id="{F06AA69C-6CDD-4A40-8984-C93353FCDFE9}"/>
               </a:ext>
             </a:extLst>
           </p:cNvPr>
@@ -5292,7 +5292,7 @@
           <p:cNvPr id="55" name="TextBox 54">
             <a:extLst>
               <a:ext uri="{FF2B5EF4-FFF2-40B4-BE49-F238E27FC236}">
-                <a16:creationId xmlns:a16="http://schemas.microsoft.com/office/drawing/2014/main" xmlns="" id="{5C2E9F42-9C35-4A00-9C1E-62F2044B670D}"/>
+                <a16:creationId xmlns:a16="http://schemas.microsoft.com/office/drawing/2014/main" id="{5C2E9F42-9C35-4A00-9C1E-62F2044B670D}"/>
               </a:ext>
             </a:extLst>
           </p:cNvPr>
@@ -5345,7 +5345,7 @@
           <p:cNvPr id="56" name="Straight Arrow Connector 55">
             <a:extLst>
               <a:ext uri="{FF2B5EF4-FFF2-40B4-BE49-F238E27FC236}">
-                <a16:creationId xmlns:a16="http://schemas.microsoft.com/office/drawing/2014/main" xmlns="" id="{1A6F79DE-6717-4B06-92A6-6C07EA0F81D7}"/>
+                <a16:creationId xmlns:a16="http://schemas.microsoft.com/office/drawing/2014/main" id="{1A6F79DE-6717-4B06-92A6-6C07EA0F81D7}"/>
               </a:ext>
             </a:extLst>
           </p:cNvPr>
@@ -5387,7 +5387,7 @@
           <p:cNvPr id="57" name="TextBox 56">
             <a:extLst>
               <a:ext uri="{FF2B5EF4-FFF2-40B4-BE49-F238E27FC236}">
-                <a16:creationId xmlns:a16="http://schemas.microsoft.com/office/drawing/2014/main" xmlns="" id="{94C5D4FE-764E-4EA5-A7D7-8E4639F37E24}"/>
+                <a16:creationId xmlns:a16="http://schemas.microsoft.com/office/drawing/2014/main" id="{94C5D4FE-764E-4EA5-A7D7-8E4639F37E24}"/>
               </a:ext>
             </a:extLst>
           </p:cNvPr>
@@ -5436,7 +5436,7 @@
           <p:cNvPr id="58" name="TextBox 57">
             <a:extLst>
               <a:ext uri="{FF2B5EF4-FFF2-40B4-BE49-F238E27FC236}">
-                <a16:creationId xmlns:a16="http://schemas.microsoft.com/office/drawing/2014/main" xmlns="" id="{02430570-0B37-48CB-B21A-4BE2D64DA825}"/>
+                <a16:creationId xmlns:a16="http://schemas.microsoft.com/office/drawing/2014/main" id="{02430570-0B37-48CB-B21A-4BE2D64DA825}"/>
               </a:ext>
             </a:extLst>
           </p:cNvPr>
@@ -5489,7 +5489,7 @@
           <p:cNvPr id="59" name="Straight Arrow Connector 58">
             <a:extLst>
               <a:ext uri="{FF2B5EF4-FFF2-40B4-BE49-F238E27FC236}">
-                <a16:creationId xmlns:a16="http://schemas.microsoft.com/office/drawing/2014/main" xmlns="" id="{F3D15B79-3353-4538-8969-0988740FF3E8}"/>
+                <a16:creationId xmlns:a16="http://schemas.microsoft.com/office/drawing/2014/main" id="{F3D15B79-3353-4538-8969-0988740FF3E8}"/>
               </a:ext>
             </a:extLst>
           </p:cNvPr>
@@ -5531,7 +5531,7 @@
           <p:cNvPr id="60" name="Straight Arrow Connector 59">
             <a:extLst>
               <a:ext uri="{FF2B5EF4-FFF2-40B4-BE49-F238E27FC236}">
-                <a16:creationId xmlns:a16="http://schemas.microsoft.com/office/drawing/2014/main" xmlns="" id="{EA1C5DA7-C793-4CE8-B342-72695989C060}"/>
+                <a16:creationId xmlns:a16="http://schemas.microsoft.com/office/drawing/2014/main" id="{EA1C5DA7-C793-4CE8-B342-72695989C060}"/>
               </a:ext>
             </a:extLst>
           </p:cNvPr>
@@ -5573,7 +5573,7 @@
           <p:cNvPr id="61" name="Straight Arrow Connector 60">
             <a:extLst>
               <a:ext uri="{FF2B5EF4-FFF2-40B4-BE49-F238E27FC236}">
-                <a16:creationId xmlns:a16="http://schemas.microsoft.com/office/drawing/2014/main" xmlns="" id="{955DDE6E-6FBD-46F0-A436-D4B1D3BAB163}"/>
+                <a16:creationId xmlns:a16="http://schemas.microsoft.com/office/drawing/2014/main" id="{955DDE6E-6FBD-46F0-A436-D4B1D3BAB163}"/>
               </a:ext>
             </a:extLst>
           </p:cNvPr>
@@ -5615,7 +5615,7 @@
           <p:cNvPr id="62" name="Straight Arrow Connector 61">
             <a:extLst>
               <a:ext uri="{FF2B5EF4-FFF2-40B4-BE49-F238E27FC236}">
-                <a16:creationId xmlns:a16="http://schemas.microsoft.com/office/drawing/2014/main" xmlns="" id="{53965DF6-0CE4-4F37-A27E-06B69FA66B4F}"/>
+                <a16:creationId xmlns:a16="http://schemas.microsoft.com/office/drawing/2014/main" id="{53965DF6-0CE4-4F37-A27E-06B69FA66B4F}"/>
               </a:ext>
             </a:extLst>
           </p:cNvPr>
@@ -5657,7 +5657,7 @@
           <p:cNvPr id="63" name="TextBox 62">
             <a:extLst>
               <a:ext uri="{FF2B5EF4-FFF2-40B4-BE49-F238E27FC236}">
-                <a16:creationId xmlns:a16="http://schemas.microsoft.com/office/drawing/2014/main" xmlns="" id="{18455862-600D-4E02-A8FA-51DE00243AC6}"/>
+                <a16:creationId xmlns:a16="http://schemas.microsoft.com/office/drawing/2014/main" id="{18455862-600D-4E02-A8FA-51DE00243AC6}"/>
               </a:ext>
             </a:extLst>
           </p:cNvPr>
@@ -5709,7 +5709,7 @@
           <p:cNvPr id="64" name="TextBox 63">
             <a:extLst>
               <a:ext uri="{FF2B5EF4-FFF2-40B4-BE49-F238E27FC236}">
-                <a16:creationId xmlns:a16="http://schemas.microsoft.com/office/drawing/2014/main" xmlns="" id="{A59CD8F1-878B-4D6E-B8D2-27739299F7CF}"/>
+                <a16:creationId xmlns:a16="http://schemas.microsoft.com/office/drawing/2014/main" id="{A59CD8F1-878B-4D6E-B8D2-27739299F7CF}"/>
               </a:ext>
             </a:extLst>
           </p:cNvPr>
@@ -5758,7 +5758,7 @@
           <p:cNvPr id="65" name="TextBox 64">
             <a:extLst>
               <a:ext uri="{FF2B5EF4-FFF2-40B4-BE49-F238E27FC236}">
-                <a16:creationId xmlns:a16="http://schemas.microsoft.com/office/drawing/2014/main" xmlns="" id="{51BD218C-DDD8-4DCF-9DC5-9FB31A127B0C}"/>
+                <a16:creationId xmlns:a16="http://schemas.microsoft.com/office/drawing/2014/main" id="{51BD218C-DDD8-4DCF-9DC5-9FB31A127B0C}"/>
               </a:ext>
             </a:extLst>
           </p:cNvPr>
@@ -5811,7 +5811,7 @@
           <p:cNvPr id="66" name="Straight Arrow Connector 65">
             <a:extLst>
               <a:ext uri="{FF2B5EF4-FFF2-40B4-BE49-F238E27FC236}">
-                <a16:creationId xmlns:a16="http://schemas.microsoft.com/office/drawing/2014/main" xmlns="" id="{D94357F4-7B6B-49AD-BF24-3F1C0F4211B4}"/>
+                <a16:creationId xmlns:a16="http://schemas.microsoft.com/office/drawing/2014/main" id="{D94357F4-7B6B-49AD-BF24-3F1C0F4211B4}"/>
               </a:ext>
             </a:extLst>
           </p:cNvPr>
@@ -5853,7 +5853,7 @@
           <p:cNvPr id="67" name="TextBox 66">
             <a:extLst>
               <a:ext uri="{FF2B5EF4-FFF2-40B4-BE49-F238E27FC236}">
-                <a16:creationId xmlns:a16="http://schemas.microsoft.com/office/drawing/2014/main" xmlns="" id="{F7408FE5-DF2E-4CEE-86FF-FC27827A073B}"/>
+                <a16:creationId xmlns:a16="http://schemas.microsoft.com/office/drawing/2014/main" id="{F7408FE5-DF2E-4CEE-86FF-FC27827A073B}"/>
               </a:ext>
             </a:extLst>
           </p:cNvPr>
@@ -5902,7 +5902,7 @@
           <p:cNvPr id="68" name="TextBox 67">
             <a:extLst>
               <a:ext uri="{FF2B5EF4-FFF2-40B4-BE49-F238E27FC236}">
-                <a16:creationId xmlns:a16="http://schemas.microsoft.com/office/drawing/2014/main" xmlns="" id="{620E5344-1AA0-4CA2-A820-CE616ED7A235}"/>
+                <a16:creationId xmlns:a16="http://schemas.microsoft.com/office/drawing/2014/main" id="{620E5344-1AA0-4CA2-A820-CE616ED7A235}"/>
               </a:ext>
             </a:extLst>
           </p:cNvPr>
@@ -5955,7 +5955,7 @@
           <p:cNvPr id="69" name="Straight Arrow Connector 68">
             <a:extLst>
               <a:ext uri="{FF2B5EF4-FFF2-40B4-BE49-F238E27FC236}">
-                <a16:creationId xmlns:a16="http://schemas.microsoft.com/office/drawing/2014/main" xmlns="" id="{1C29C114-0B87-4702-8014-3947DD4C4828}"/>
+                <a16:creationId xmlns:a16="http://schemas.microsoft.com/office/drawing/2014/main" id="{1C29C114-0B87-4702-8014-3947DD4C4828}"/>
               </a:ext>
             </a:extLst>
           </p:cNvPr>
@@ -5997,7 +5997,7 @@
           <p:cNvPr id="70" name="TextBox 69">
             <a:extLst>
               <a:ext uri="{FF2B5EF4-FFF2-40B4-BE49-F238E27FC236}">
-                <a16:creationId xmlns:a16="http://schemas.microsoft.com/office/drawing/2014/main" xmlns="" id="{2B856B3F-C4A8-4595-A50C-16E8B2ABAE4A}"/>
+                <a16:creationId xmlns:a16="http://schemas.microsoft.com/office/drawing/2014/main" id="{2B856B3F-C4A8-4595-A50C-16E8B2ABAE4A}"/>
               </a:ext>
             </a:extLst>
           </p:cNvPr>
@@ -6046,7 +6046,7 @@
           <p:cNvPr id="71" name="TextBox 70">
             <a:extLst>
               <a:ext uri="{FF2B5EF4-FFF2-40B4-BE49-F238E27FC236}">
-                <a16:creationId xmlns:a16="http://schemas.microsoft.com/office/drawing/2014/main" xmlns="" id="{089F75D9-FD4E-42EF-9ADC-85BD0242BD8B}"/>
+                <a16:creationId xmlns:a16="http://schemas.microsoft.com/office/drawing/2014/main" id="{089F75D9-FD4E-42EF-9ADC-85BD0242BD8B}"/>
               </a:ext>
             </a:extLst>
           </p:cNvPr>
@@ -6099,7 +6099,7 @@
           <p:cNvPr id="72" name="Straight Arrow Connector 71">
             <a:extLst>
               <a:ext uri="{FF2B5EF4-FFF2-40B4-BE49-F238E27FC236}">
-                <a16:creationId xmlns:a16="http://schemas.microsoft.com/office/drawing/2014/main" xmlns="" id="{34CD601C-5F30-42E1-B007-E8FA142C807F}"/>
+                <a16:creationId xmlns:a16="http://schemas.microsoft.com/office/drawing/2014/main" id="{34CD601C-5F30-42E1-B007-E8FA142C807F}"/>
               </a:ext>
             </a:extLst>
           </p:cNvPr>
@@ -6141,7 +6141,7 @@
           <p:cNvPr id="73" name="Straight Arrow Connector 72">
             <a:extLst>
               <a:ext uri="{FF2B5EF4-FFF2-40B4-BE49-F238E27FC236}">
-                <a16:creationId xmlns:a16="http://schemas.microsoft.com/office/drawing/2014/main" xmlns="" id="{37E3B069-1F2E-4861-B180-FD8A882741F1}"/>
+                <a16:creationId xmlns:a16="http://schemas.microsoft.com/office/drawing/2014/main" id="{37E3B069-1F2E-4861-B180-FD8A882741F1}"/>
               </a:ext>
             </a:extLst>
           </p:cNvPr>
@@ -6183,7 +6183,7 @@
           <p:cNvPr id="74" name="Straight Arrow Connector 73">
             <a:extLst>
               <a:ext uri="{FF2B5EF4-FFF2-40B4-BE49-F238E27FC236}">
-                <a16:creationId xmlns:a16="http://schemas.microsoft.com/office/drawing/2014/main" xmlns="" id="{4D5574A7-9394-49BB-9740-D3A89C3AFD64}"/>
+                <a16:creationId xmlns:a16="http://schemas.microsoft.com/office/drawing/2014/main" id="{4D5574A7-9394-49BB-9740-D3A89C3AFD64}"/>
               </a:ext>
             </a:extLst>
           </p:cNvPr>
@@ -6225,7 +6225,7 @@
           <p:cNvPr id="75" name="Straight Arrow Connector 74">
             <a:extLst>
               <a:ext uri="{FF2B5EF4-FFF2-40B4-BE49-F238E27FC236}">
-                <a16:creationId xmlns:a16="http://schemas.microsoft.com/office/drawing/2014/main" xmlns="" id="{5E4B54F9-36B6-4B8A-8386-783F172A2B2C}"/>
+                <a16:creationId xmlns:a16="http://schemas.microsoft.com/office/drawing/2014/main" id="{5E4B54F9-36B6-4B8A-8386-783F172A2B2C}"/>
               </a:ext>
             </a:extLst>
           </p:cNvPr>
@@ -6267,7 +6267,7 @@
           <p:cNvPr id="76" name="TextBox 75">
             <a:extLst>
               <a:ext uri="{FF2B5EF4-FFF2-40B4-BE49-F238E27FC236}">
-                <a16:creationId xmlns:a16="http://schemas.microsoft.com/office/drawing/2014/main" xmlns="" id="{05131181-1404-42A8-B79C-C98EAAFD1F0B}"/>
+                <a16:creationId xmlns:a16="http://schemas.microsoft.com/office/drawing/2014/main" id="{05131181-1404-42A8-B79C-C98EAAFD1F0B}"/>
               </a:ext>
             </a:extLst>
           </p:cNvPr>
@@ -6316,7 +6316,7 @@
           <p:cNvPr id="77" name="TextBox 76">
             <a:extLst>
               <a:ext uri="{FF2B5EF4-FFF2-40B4-BE49-F238E27FC236}">
-                <a16:creationId xmlns:a16="http://schemas.microsoft.com/office/drawing/2014/main" xmlns="" id="{022A2E03-4F84-4521-B5AC-2A5D852E5F59}"/>
+                <a16:creationId xmlns:a16="http://schemas.microsoft.com/office/drawing/2014/main" id="{022A2E03-4F84-4521-B5AC-2A5D852E5F59}"/>
               </a:ext>
             </a:extLst>
           </p:cNvPr>
@@ -6365,7 +6365,7 @@
           <p:cNvPr id="78" name="TextBox 77">
             <a:extLst>
               <a:ext uri="{FF2B5EF4-FFF2-40B4-BE49-F238E27FC236}">
-                <a16:creationId xmlns:a16="http://schemas.microsoft.com/office/drawing/2014/main" xmlns="" id="{8D4C2514-30B1-4C7E-812A-9BE07041DA72}"/>
+                <a16:creationId xmlns:a16="http://schemas.microsoft.com/office/drawing/2014/main" id="{8D4C2514-30B1-4C7E-812A-9BE07041DA72}"/>
               </a:ext>
             </a:extLst>
           </p:cNvPr>
@@ -6414,7 +6414,7 @@
           <p:cNvPr id="79" name="TextBox 78">
             <a:extLst>
               <a:ext uri="{FF2B5EF4-FFF2-40B4-BE49-F238E27FC236}">
-                <a16:creationId xmlns:a16="http://schemas.microsoft.com/office/drawing/2014/main" xmlns="" id="{757B4285-51AD-4743-8D4C-C630D18DC23C}"/>
+                <a16:creationId xmlns:a16="http://schemas.microsoft.com/office/drawing/2014/main" id="{757B4285-51AD-4743-8D4C-C630D18DC23C}"/>
               </a:ext>
             </a:extLst>
           </p:cNvPr>
@@ -6463,7 +6463,7 @@
           <p:cNvPr id="80" name="TextBox 79">
             <a:extLst>
               <a:ext uri="{FF2B5EF4-FFF2-40B4-BE49-F238E27FC236}">
-                <a16:creationId xmlns:a16="http://schemas.microsoft.com/office/drawing/2014/main" xmlns="" id="{8F4CD7A3-7BAE-4C8C-B164-58CCF0A04163}"/>
+                <a16:creationId xmlns:a16="http://schemas.microsoft.com/office/drawing/2014/main" id="{8F4CD7A3-7BAE-4C8C-B164-58CCF0A04163}"/>
               </a:ext>
             </a:extLst>
           </p:cNvPr>
@@ -6512,7 +6512,7 @@
           <p:cNvPr id="81" name="TextBox 80">
             <a:extLst>
               <a:ext uri="{FF2B5EF4-FFF2-40B4-BE49-F238E27FC236}">
-                <a16:creationId xmlns:a16="http://schemas.microsoft.com/office/drawing/2014/main" xmlns="" id="{B660D915-072D-4CE0-9208-4B2097538925}"/>
+                <a16:creationId xmlns:a16="http://schemas.microsoft.com/office/drawing/2014/main" id="{B660D915-072D-4CE0-9208-4B2097538925}"/>
               </a:ext>
             </a:extLst>
           </p:cNvPr>
@@ -6561,7 +6561,7 @@
           <p:cNvPr id="82" name="TextBox 81">
             <a:extLst>
               <a:ext uri="{FF2B5EF4-FFF2-40B4-BE49-F238E27FC236}">
-                <a16:creationId xmlns:a16="http://schemas.microsoft.com/office/drawing/2014/main" xmlns="" id="{821F3225-6094-4B24-9C27-DD15EFCA6C44}"/>
+                <a16:creationId xmlns:a16="http://schemas.microsoft.com/office/drawing/2014/main" id="{821F3225-6094-4B24-9C27-DD15EFCA6C44}"/>
               </a:ext>
             </a:extLst>
           </p:cNvPr>
@@ -6612,7 +6612,7 @@
           <p:cNvPr id="84" name="TextBox 83">
             <a:extLst>
               <a:ext uri="{FF2B5EF4-FFF2-40B4-BE49-F238E27FC236}">
-                <a16:creationId xmlns:a16="http://schemas.microsoft.com/office/drawing/2014/main" xmlns="" id="{7DFFFC7A-061B-4319-94D9-9899227F3245}"/>
+                <a16:creationId xmlns:a16="http://schemas.microsoft.com/office/drawing/2014/main" id="{7DFFFC7A-061B-4319-94D9-9899227F3245}"/>
               </a:ext>
             </a:extLst>
           </p:cNvPr>
@@ -6647,7 +6647,7 @@
           <p:cNvPr id="85" name="TextBox 84">
             <a:extLst>
               <a:ext uri="{FF2B5EF4-FFF2-40B4-BE49-F238E27FC236}">
-                <a16:creationId xmlns:a16="http://schemas.microsoft.com/office/drawing/2014/main" xmlns="" id="{96AE48C5-8FB9-473F-985E-A50BD707B8DB}"/>
+                <a16:creationId xmlns:a16="http://schemas.microsoft.com/office/drawing/2014/main" id="{96AE48C5-8FB9-473F-985E-A50BD707B8DB}"/>
               </a:ext>
             </a:extLst>
           </p:cNvPr>
@@ -6682,7 +6682,7 @@
           <p:cNvPr id="86" name="TextBox 85">
             <a:extLst>
               <a:ext uri="{FF2B5EF4-FFF2-40B4-BE49-F238E27FC236}">
-                <a16:creationId xmlns:a16="http://schemas.microsoft.com/office/drawing/2014/main" xmlns="" id="{D5FFBE7D-5E61-4430-AF7E-7F65D318CF7D}"/>
+                <a16:creationId xmlns:a16="http://schemas.microsoft.com/office/drawing/2014/main" id="{D5FFBE7D-5E61-4430-AF7E-7F65D318CF7D}"/>
               </a:ext>
             </a:extLst>
           </p:cNvPr>
@@ -6717,7 +6717,7 @@
           <p:cNvPr id="87" name="TextBox 86">
             <a:extLst>
               <a:ext uri="{FF2B5EF4-FFF2-40B4-BE49-F238E27FC236}">
-                <a16:creationId xmlns:a16="http://schemas.microsoft.com/office/drawing/2014/main" xmlns="" id="{28E242D5-B4F3-4B4F-B5A0-061D34EB0578}"/>
+                <a16:creationId xmlns:a16="http://schemas.microsoft.com/office/drawing/2014/main" id="{28E242D5-B4F3-4B4F-B5A0-061D34EB0578}"/>
               </a:ext>
             </a:extLst>
           </p:cNvPr>
@@ -6752,7 +6752,7 @@
           <p:cNvPr id="89" name="TextBox 88">
             <a:extLst>
               <a:ext uri="{FF2B5EF4-FFF2-40B4-BE49-F238E27FC236}">
-                <a16:creationId xmlns:a16="http://schemas.microsoft.com/office/drawing/2014/main" xmlns="" id="{63151A96-B412-479E-B3FF-18D0D73EC934}"/>
+                <a16:creationId xmlns:a16="http://schemas.microsoft.com/office/drawing/2014/main" id="{63151A96-B412-479E-B3FF-18D0D73EC934}"/>
               </a:ext>
             </a:extLst>
           </p:cNvPr>
@@ -6762,7 +6762,7 @@
         <p:spPr>
           <a:xfrm>
             <a:off x="304800" y="8848724"/>
-            <a:ext cx="10896600" cy="3416320"/>
+            <a:ext cx="10896600" cy="3139321"/>
           </a:xfrm>
           <a:prstGeom prst="rect">
             <a:avLst/>
@@ -6777,15 +6777,11 @@
           <a:p>
             <a:r>
               <a:rPr lang="en-GB" dirty="0"/>
-              <a:t>Figure 1. Simple experimental designs in </a:t>
-            </a:r>
-            <a:r>
-              <a:rPr lang="en-GB" dirty="0" err="1"/>
-              <a:t>mzTab</a:t>
+              <a:t>Figure 1. </a:t>
             </a:r>
             <a:r>
               <a:rPr lang="en-GB" dirty="0"/>
-              <a:t> can be represented using a combination of </a:t>
+              <a:t>Simple experimental designs in mzTab can be represented using a combination of </a:t>
             </a:r>
             <a:r>
               <a:rPr lang="en-GB" dirty="0" err="1"/>
@@ -6801,31 +6797,7 @@
             </a:r>
             <a:r>
               <a:rPr lang="en-GB" dirty="0"/>
-              <a:t> and sample. Quantitative values can be reported in files for SVs and assays. A) SV is intended to capture different groups of replicates, which might have resulted from different sample types e.g. control versus treated (as 2 SVs), </a:t>
-            </a:r>
-            <a:r>
-              <a:rPr lang="en-GB" i="1" dirty="0"/>
-              <a:t>n </a:t>
-            </a:r>
-            <a:r>
-              <a:rPr lang="en-GB" dirty="0"/>
-              <a:t>time points over a treatment course (as </a:t>
-            </a:r>
-            <a:r>
-              <a:rPr lang="en-GB" i="1" dirty="0"/>
-              <a:t>n</a:t>
-            </a:r>
-            <a:r>
-              <a:rPr lang="en-GB" dirty="0"/>
-              <a:t> SVs). Nested designs can be captured by annotation of additional CV terms onto SVs. B) assay captures a measurement made about a molecule (peptide or small molecule) where multiple assays within the same group are taken to be replicates of some kind (biological or technical). Additional details about the sample processing to generate an assay should not be captured in </a:t>
-            </a:r>
-            <a:r>
-              <a:rPr lang="en-GB" dirty="0" err="1"/>
-              <a:t>mzTab</a:t>
-            </a:r>
-            <a:r>
-              <a:rPr lang="en-GB" dirty="0"/>
-              <a:t>, but could be captured via a reference to an external suitable format such as ISA-TAB. C) </a:t>
+              <a:t> and sample. Quantitative values can be reported in files for SVs and assays. A) SV is intended to capture different groups of replicates, which might have resulted from different sample types e.g. control versus treated (as 2 SVs), n time points over a treatment course (as n SVs). Nested designs can be captured by annotation of additional CV terms onto SVs. B) assay captures a measurement made about a molecule (small molecule/lipid) where multiple assays within the same group are taken to be replicates of some kind (biological or technical). Additional details about the sample processing to generate an assay should not be captured in mzTab, but could be captured via a reference to an external suitable format such as ISA-TAB. C) </a:t>
             </a:r>
             <a:r>
               <a:rPr lang="en-GB" dirty="0" err="1"/>
@@ -6849,16 +6821,9 @@
             </a:r>
             <a:r>
               <a:rPr lang="en-GB" dirty="0"/>
-              <a:t> can have a nested structure enabling assay to reference to a group of MS files. D) samples are optional in </a:t>
-            </a:r>
-            <a:r>
-              <a:rPr lang="en-GB" dirty="0" err="1"/>
-              <a:t>mzTab</a:t>
-            </a:r>
-            <a:r>
-              <a:rPr lang="en-GB" dirty="0"/>
-              <a:t> since the quantitative software may often be unaware of the biological samples that have been analysed.</a:t>
-            </a:r>
+              <a:t> can have a nested structure enabling assay to reference to a group of MS files. D) samples are optional in mzTab since the quantitative software may often be unaware of the biological samples that have been analysed.</a:t>
+            </a:r>
+            <a:endParaRPr lang="en-GB" dirty="0"/>
           </a:p>
         </p:txBody>
       </p:sp>

</xml_diff>